<commit_message>
put in qnrl logos and complex conditional
</commit_message>
<xml_diff>
--- a/Presentation1.pptx
+++ b/Presentation1.pptx
@@ -5,23 +5,26 @@
     <p:sldMasterId id="2147483648" r:id="rId2"/>
   </p:sldMasterIdLst>
   <p:notesMasterIdLst>
-    <p:notesMasterId r:id="rId14"/>
+    <p:notesMasterId r:id="rId17"/>
   </p:notesMasterIdLst>
   <p:handoutMasterIdLst>
-    <p:handoutMasterId r:id="rId15"/>
+    <p:handoutMasterId r:id="rId18"/>
   </p:handoutMasterIdLst>
   <p:sldIdLst>
     <p:sldId id="261" r:id="rId3"/>
-    <p:sldId id="271" r:id="rId4"/>
-    <p:sldId id="272" r:id="rId5"/>
-    <p:sldId id="274" r:id="rId6"/>
-    <p:sldId id="273" r:id="rId7"/>
-    <p:sldId id="275" r:id="rId8"/>
-    <p:sldId id="276" r:id="rId9"/>
-    <p:sldId id="277" r:id="rId10"/>
-    <p:sldId id="279" r:id="rId11"/>
-    <p:sldId id="280" r:id="rId12"/>
-    <p:sldId id="278" r:id="rId13"/>
+    <p:sldId id="281" r:id="rId4"/>
+    <p:sldId id="271" r:id="rId5"/>
+    <p:sldId id="272" r:id="rId6"/>
+    <p:sldId id="274" r:id="rId7"/>
+    <p:sldId id="273" r:id="rId8"/>
+    <p:sldId id="275" r:id="rId9"/>
+    <p:sldId id="282" r:id="rId10"/>
+    <p:sldId id="276" r:id="rId11"/>
+    <p:sldId id="277" r:id="rId12"/>
+    <p:sldId id="279" r:id="rId13"/>
+    <p:sldId id="280" r:id="rId14"/>
+    <p:sldId id="283" r:id="rId15"/>
+    <p:sldId id="278" r:id="rId16"/>
   </p:sldIdLst>
   <p:sldSz cx="12192000" cy="6858000"/>
   <p:notesSz cx="6858000" cy="9144000"/>
@@ -224,7 +227,7 @@
           <a:p>
             <a:fld id="{59041DB8-B66F-4DC8-A96E-33677E0F90FF}" type="datetimeFigureOut">
               <a:rPr lang="en-US" smtClean="0"/>
-              <a:t>5/12/2016</a:t>
+              <a:t>5/13/2016</a:t>
             </a:fld>
             <a:endParaRPr lang="en-US"/>
           </a:p>
@@ -389,7 +392,7 @@
           <a:p>
             <a:fld id="{DEB49C4A-65AC-492D-9701-81B46C3AD0E4}" type="datetimeFigureOut">
               <a:rPr lang="en-US" smtClean="0"/>
-              <a:t>5/12/2016</a:t>
+              <a:t>5/13/2016</a:t>
             </a:fld>
             <a:endParaRPr lang="en-US"/>
           </a:p>
@@ -2777,7 +2780,7 @@
           <a:p>
             <a:fld id="{384A29A4-78C8-47AB-BA06-22CB45938951}" type="datetime1">
               <a:rPr lang="en-US" smtClean="0"/>
-              <a:t>5/12/2016</a:t>
+              <a:t>5/13/2016</a:t>
             </a:fld>
             <a:endParaRPr lang="en-US"/>
           </a:p>
@@ -2969,7 +2972,7 @@
           <a:p>
             <a:fld id="{E1ED4ACF-2D82-46F2-A8E9-23963AA34E86}" type="datetime1">
               <a:rPr lang="en-US" smtClean="0"/>
-              <a:t>5/12/2016</a:t>
+              <a:t>5/13/2016</a:t>
             </a:fld>
             <a:endParaRPr lang="en-US"/>
           </a:p>
@@ -3151,7 +3154,7 @@
           <a:p>
             <a:fld id="{AE374B5B-21A0-4192-BF4C-38187F1A68D8}" type="datetime1">
               <a:rPr lang="en-US" smtClean="0"/>
-              <a:t>5/12/2016</a:t>
+              <a:t>5/13/2016</a:t>
             </a:fld>
             <a:endParaRPr lang="en-US"/>
           </a:p>
@@ -5491,7 +5494,7 @@
           <a:p>
             <a:fld id="{33B5CF7C-B333-48E1-A4A6-83A3C8B73AC0}" type="datetime1">
               <a:rPr lang="en-US" smtClean="0"/>
-              <a:t>5/12/2016</a:t>
+              <a:t>5/13/2016</a:t>
             </a:fld>
             <a:endParaRPr lang="en-US"/>
           </a:p>
@@ -5943,7 +5946,7 @@
           <a:p>
             <a:fld id="{AE320762-5CBF-4210-AB54-376B091119F8}" type="datetime1">
               <a:rPr lang="en-US" smtClean="0"/>
-              <a:t>5/12/2016</a:t>
+              <a:t>5/13/2016</a:t>
             </a:fld>
             <a:endParaRPr lang="en-US"/>
           </a:p>
@@ -6073,7 +6076,7 @@
           <a:p>
             <a:fld id="{7F0DB371-BF5F-4058-A212-1A908E4D2674}" type="datetime1">
               <a:rPr lang="en-US" smtClean="0"/>
-              <a:t>5/12/2016</a:t>
+              <a:t>5/13/2016</a:t>
             </a:fld>
             <a:endParaRPr lang="en-US"/>
           </a:p>
@@ -8003,7 +8006,7 @@
           <a:p>
             <a:fld id="{60A4083B-90AA-48CF-BAD5-00AA24D7F288}" type="datetime1">
               <a:rPr lang="en-US" smtClean="0"/>
-              <a:t>5/12/2016</a:t>
+              <a:t>5/13/2016</a:t>
             </a:fld>
             <a:endParaRPr lang="en-US"/>
           </a:p>
@@ -10250,7 +10253,7 @@
           <a:p>
             <a:fld id="{F5BAF629-ECA2-4CF3-B790-9D9BDED98269}" type="datetime1">
               <a:rPr lang="en-US" smtClean="0"/>
-              <a:t>5/12/2016</a:t>
+              <a:t>5/13/2016</a:t>
             </a:fld>
             <a:endParaRPr lang="en-US"/>
           </a:p>
@@ -14479,7 +14482,7 @@
           <a:p>
             <a:fld id="{B51B2453-8663-4C69-AF73-9FD7B1DEC5D0}" type="datetime1">
               <a:rPr lang="en-US" smtClean="0"/>
-              <a:t>5/12/2016</a:t>
+              <a:t>5/13/2016</a:t>
             </a:fld>
             <a:endParaRPr lang="en-US"/>
           </a:p>
@@ -15008,19 +15011,7 @@
             <a:pPr algn="ctr"/>
             <a:r>
               <a:rPr lang="en-US" sz="4400" dirty="0" smtClean="0"/>
-              <a:t>Refactoring towards </a:t>
-            </a:r>
-            <a:r>
-              <a:rPr lang="en-US" sz="4400" dirty="0" smtClean="0"/>
-              <a:t>testable </a:t>
-            </a:r>
-            <a:r>
-              <a:rPr lang="en-US" sz="4400" dirty="0" smtClean="0"/>
-              <a:t>code and happier </a:t>
-            </a:r>
-            <a:r>
-              <a:rPr lang="en-US" sz="4400" dirty="0" smtClean="0"/>
-              <a:t>developers</a:t>
+              <a:t>Refactoring towards testable code and happier developers</a:t>
             </a:r>
             <a:br>
               <a:rPr lang="en-US" sz="4400" dirty="0" smtClean="0"/>
@@ -15159,6 +15150,206 @@
           <a:chExt cx="0" cy="0"/>
         </a:xfrm>
       </p:grpSpPr>
+      <p:pic>
+        <p:nvPicPr>
+          <p:cNvPr id="3" name="Picture 2"/>
+          <p:cNvPicPr>
+            <a:picLocks noChangeAspect="1"/>
+          </p:cNvPicPr>
+          <p:nvPr/>
+        </p:nvPicPr>
+        <p:blipFill>
+          <a:blip r:embed="rId2"/>
+          <a:stretch>
+            <a:fillRect/>
+          </a:stretch>
+        </p:blipFill>
+        <p:spPr>
+          <a:xfrm>
+            <a:off x="1834647" y="0"/>
+            <a:ext cx="9239753" cy="6746487"/>
+          </a:xfrm>
+          <a:prstGeom prst="rect">
+            <a:avLst/>
+          </a:prstGeom>
+        </p:spPr>
+      </p:pic>
+    </p:spTree>
+    <p:extLst>
+      <p:ext uri="{BB962C8B-B14F-4D97-AF65-F5344CB8AC3E}">
+        <p14:creationId xmlns:p14="http://schemas.microsoft.com/office/powerpoint/2010/main" val="3100252087"/>
+      </p:ext>
+    </p:extLst>
+  </p:cSld>
+  <p:clrMapOvr>
+    <a:masterClrMapping/>
+  </p:clrMapOvr>
+  <mc:AlternateContent xmlns:mc="http://schemas.openxmlformats.org/markup-compatibility/2006" xmlns:p14="http://schemas.microsoft.com/office/powerpoint/2010/main">
+    <mc:Choice Requires="p14">
+      <p:transition spd="med" p14:dur="700">
+        <p:fade/>
+      </p:transition>
+    </mc:Choice>
+    <mc:Fallback xmlns="">
+      <p:transition spd="med">
+        <p:fade/>
+      </p:transition>
+    </mc:Fallback>
+  </mc:AlternateContent>
+  <p:timing>
+    <p:tnLst>
+      <p:par>
+        <p:cTn id="1" dur="indefinite" restart="never" nodeType="tmRoot"/>
+      </p:par>
+    </p:tnLst>
+  </p:timing>
+</p:sld>
+</file>
+
+<file path=ppt/slides/slide11.xml><?xml version="1.0" encoding="utf-8"?>
+<p:sld xmlns:a="http://schemas.openxmlformats.org/drawingml/2006/main" xmlns:r="http://schemas.openxmlformats.org/officeDocument/2006/relationships" xmlns:p="http://schemas.openxmlformats.org/presentationml/2006/main">
+  <p:cSld>
+    <p:spTree>
+      <p:nvGrpSpPr>
+        <p:cNvPr id="1" name=""/>
+        <p:cNvGrpSpPr/>
+        <p:nvPr/>
+      </p:nvGrpSpPr>
+      <p:grpSpPr>
+        <a:xfrm>
+          <a:off x="0" y="0"/>
+          <a:ext cx="0" cy="0"/>
+          <a:chOff x="0" y="0"/>
+          <a:chExt cx="0" cy="0"/>
+        </a:xfrm>
+      </p:grpSpPr>
+      <p:sp>
+        <p:nvSpPr>
+          <p:cNvPr id="4" name="Title 3"/>
+          <p:cNvSpPr>
+            <a:spLocks noGrp="1"/>
+          </p:cNvSpPr>
+          <p:nvPr>
+            <p:ph type="title"/>
+          </p:nvPr>
+        </p:nvSpPr>
+        <p:spPr>
+          <a:xfrm>
+            <a:off x="763095" y="255001"/>
+            <a:ext cx="9017000" cy="1142385"/>
+          </a:xfrm>
+        </p:spPr>
+        <p:txBody>
+          <a:bodyPr>
+            <a:normAutofit/>
+          </a:bodyPr>
+          <a:lstStyle/>
+          <a:p>
+            <a:r>
+              <a:rPr lang="en-GB" dirty="0" smtClean="0"/>
+              <a:t>Favour Short local scope variable names</a:t>
+            </a:r>
+            <a:endParaRPr lang="en-GB" dirty="0"/>
+          </a:p>
+        </p:txBody>
+      </p:sp>
+      <p:pic>
+        <p:nvPicPr>
+          <p:cNvPr id="9" name="Picture 8"/>
+          <p:cNvPicPr>
+            <a:picLocks noChangeAspect="1"/>
+          </p:cNvPicPr>
+          <p:nvPr/>
+        </p:nvPicPr>
+        <p:blipFill>
+          <a:blip r:embed="rId2"/>
+          <a:stretch>
+            <a:fillRect/>
+          </a:stretch>
+        </p:blipFill>
+        <p:spPr>
+          <a:xfrm>
+            <a:off x="323604" y="3276546"/>
+            <a:ext cx="10998376" cy="1193853"/>
+          </a:xfrm>
+          <a:prstGeom prst="rect">
+            <a:avLst/>
+          </a:prstGeom>
+        </p:spPr>
+      </p:pic>
+      <p:pic>
+        <p:nvPicPr>
+          <p:cNvPr id="10" name="Picture 9"/>
+          <p:cNvPicPr>
+            <a:picLocks noChangeAspect="1"/>
+          </p:cNvPicPr>
+          <p:nvPr/>
+        </p:nvPicPr>
+        <p:blipFill>
+          <a:blip r:embed="rId3"/>
+          <a:stretch>
+            <a:fillRect/>
+          </a:stretch>
+        </p:blipFill>
+        <p:spPr>
+          <a:xfrm>
+            <a:off x="323604" y="1695321"/>
+            <a:ext cx="11868396" cy="946279"/>
+          </a:xfrm>
+          <a:prstGeom prst="rect">
+            <a:avLst/>
+          </a:prstGeom>
+        </p:spPr>
+      </p:pic>
+    </p:spTree>
+    <p:extLst>
+      <p:ext uri="{BB962C8B-B14F-4D97-AF65-F5344CB8AC3E}">
+        <p14:creationId xmlns:p14="http://schemas.microsoft.com/office/powerpoint/2010/main" val="3429473598"/>
+      </p:ext>
+    </p:extLst>
+  </p:cSld>
+  <p:clrMapOvr>
+    <a:masterClrMapping/>
+  </p:clrMapOvr>
+  <mc:AlternateContent xmlns:mc="http://schemas.openxmlformats.org/markup-compatibility/2006" xmlns:p14="http://schemas.microsoft.com/office/powerpoint/2010/main">
+    <mc:Choice Requires="p14">
+      <p:transition spd="med" p14:dur="700">
+        <p:fade/>
+      </p:transition>
+    </mc:Choice>
+    <mc:Fallback xmlns="">
+      <p:transition spd="med">
+        <p:fade/>
+      </p:transition>
+    </mc:Fallback>
+  </mc:AlternateContent>
+  <p:timing>
+    <p:tnLst>
+      <p:par>
+        <p:cTn id="1" dur="indefinite" restart="never" nodeType="tmRoot"/>
+      </p:par>
+    </p:tnLst>
+  </p:timing>
+</p:sld>
+</file>
+
+<file path=ppt/slides/slide12.xml><?xml version="1.0" encoding="utf-8"?>
+<p:sld xmlns:a="http://schemas.openxmlformats.org/drawingml/2006/main" xmlns:r="http://schemas.openxmlformats.org/officeDocument/2006/relationships" xmlns:p="http://schemas.openxmlformats.org/presentationml/2006/main">
+  <p:cSld>
+    <p:spTree>
+      <p:nvGrpSpPr>
+        <p:cNvPr id="1" name=""/>
+        <p:cNvGrpSpPr/>
+        <p:nvPr/>
+      </p:nvGrpSpPr>
+      <p:grpSpPr>
+        <a:xfrm>
+          <a:off x="0" y="0"/>
+          <a:ext cx="0" cy="0"/>
+          <a:chOff x="0" y="0"/>
+          <a:chExt cx="0" cy="0"/>
+        </a:xfrm>
+      </p:grpSpPr>
       <p:sp>
         <p:nvSpPr>
           <p:cNvPr id="4" name="Title 3"/>
@@ -15235,7 +15426,7 @@
         </p:blipFill>
         <p:spPr>
           <a:xfrm>
-            <a:off x="505714" y="3771900"/>
+            <a:off x="607314" y="3835400"/>
             <a:ext cx="10012172" cy="2181529"/>
           </a:xfrm>
           <a:prstGeom prst="rect">
@@ -15306,7 +15497,131 @@
 </p:sld>
 </file>
 
-<file path=ppt/slides/slide11.xml><?xml version="1.0" encoding="utf-8"?>
+<file path=ppt/slides/slide13.xml><?xml version="1.0" encoding="utf-8"?>
+<p:sld xmlns:a="http://schemas.openxmlformats.org/drawingml/2006/main" xmlns:r="http://schemas.openxmlformats.org/officeDocument/2006/relationships" xmlns:p="http://schemas.openxmlformats.org/presentationml/2006/main">
+  <p:cSld>
+    <p:spTree>
+      <p:nvGrpSpPr>
+        <p:cNvPr id="1" name=""/>
+        <p:cNvGrpSpPr/>
+        <p:nvPr/>
+      </p:nvGrpSpPr>
+      <p:grpSpPr>
+        <a:xfrm>
+          <a:off x="0" y="0"/>
+          <a:ext cx="0" cy="0"/>
+          <a:chOff x="0" y="0"/>
+          <a:chExt cx="0" cy="0"/>
+        </a:xfrm>
+      </p:grpSpPr>
+      <p:sp>
+        <p:nvSpPr>
+          <p:cNvPr id="4" name="Title 3"/>
+          <p:cNvSpPr>
+            <a:spLocks noGrp="1"/>
+          </p:cNvSpPr>
+          <p:nvPr>
+            <p:ph type="title"/>
+          </p:nvPr>
+        </p:nvSpPr>
+        <p:spPr>
+          <a:xfrm>
+            <a:off x="763095" y="255001"/>
+            <a:ext cx="4850305" cy="1142385"/>
+          </a:xfrm>
+        </p:spPr>
+        <p:txBody>
+          <a:bodyPr>
+            <a:normAutofit/>
+          </a:bodyPr>
+          <a:lstStyle/>
+          <a:p>
+            <a:r>
+              <a:rPr lang="en-GB" dirty="0" smtClean="0"/>
+              <a:t>Complex Expressions</a:t>
+            </a:r>
+            <a:endParaRPr lang="en-GB" dirty="0"/>
+          </a:p>
+        </p:txBody>
+      </p:sp>
+      <p:sp>
+        <p:nvSpPr>
+          <p:cNvPr id="5" name="TextBox 4"/>
+          <p:cNvSpPr txBox="1"/>
+          <p:nvPr/>
+        </p:nvSpPr>
+        <p:spPr>
+          <a:xfrm>
+            <a:off x="870187" y="1397386"/>
+            <a:ext cx="6387348" cy="707886"/>
+          </a:xfrm>
+          <a:prstGeom prst="rect">
+            <a:avLst/>
+          </a:prstGeom>
+          <a:noFill/>
+        </p:spPr>
+        <p:txBody>
+          <a:bodyPr wrap="square" rtlCol="0">
+            <a:spAutoFit/>
+          </a:bodyPr>
+          <a:lstStyle/>
+          <a:p>
+            <a:r>
+              <a:rPr lang="en-GB" sz="2000" dirty="0" smtClean="0"/>
+              <a:t>Try to encapsulate</a:t>
+            </a:r>
+          </a:p>
+          <a:p>
+            <a:r>
+              <a:rPr lang="en-GB" sz="2000" dirty="0">
+                <a:hlinkClick r:id="rId2"/>
+              </a:rPr>
+              <a:t>Refactoring Lynda Notes</a:t>
+            </a:r>
+            <a:r>
+              <a:rPr lang="en-GB" sz="2000" dirty="0"/>
+              <a:t>  (</a:t>
+            </a:r>
+            <a:r>
+              <a:rPr lang="en-GB" sz="2000" dirty="0">
+                <a:hlinkClick r:id="rId3"/>
+              </a:rPr>
+              <a:t>Web view</a:t>
+            </a:r>
+            <a:r>
+              <a:rPr lang="en-GB" sz="2000" dirty="0"/>
+              <a:t>)</a:t>
+            </a:r>
+            <a:endParaRPr lang="en-GB" sz="2000" dirty="0"/>
+          </a:p>
+        </p:txBody>
+      </p:sp>
+    </p:spTree>
+    <p:extLst>
+      <p:ext uri="{BB962C8B-B14F-4D97-AF65-F5344CB8AC3E}">
+        <p14:creationId xmlns:p14="http://schemas.microsoft.com/office/powerpoint/2010/main" val="3785300454"/>
+      </p:ext>
+    </p:extLst>
+  </p:cSld>
+  <p:clrMapOvr>
+    <a:masterClrMapping/>
+  </p:clrMapOvr>
+  <mc:AlternateContent xmlns:mc="http://schemas.openxmlformats.org/markup-compatibility/2006" xmlns:p14="http://schemas.microsoft.com/office/powerpoint/2010/main">
+    <mc:Choice Requires="p14">
+      <p:transition spd="med" p14:dur="700">
+        <p:fade/>
+      </p:transition>
+    </mc:Choice>
+    <mc:Fallback xmlns="">
+      <p:transition spd="med">
+        <p:fade/>
+      </p:transition>
+    </mc:Fallback>
+  </mc:AlternateContent>
+</p:sld>
+</file>
+
+<file path=ppt/slides/slide14.xml><?xml version="1.0" encoding="utf-8"?>
 <p:sld xmlns:a="http://schemas.openxmlformats.org/drawingml/2006/main" xmlns:r="http://schemas.openxmlformats.org/officeDocument/2006/relationships" xmlns:p="http://schemas.openxmlformats.org/presentationml/2006/main">
   <p:cSld>
     <p:spTree>
@@ -15367,6 +15682,414 @@
       </p:grpSpPr>
       <p:sp>
         <p:nvSpPr>
+          <p:cNvPr id="4" name="Title 1"/>
+          <p:cNvSpPr txBox="1">
+            <a:spLocks/>
+          </p:cNvSpPr>
+          <p:nvPr/>
+        </p:nvSpPr>
+        <p:spPr>
+          <a:xfrm>
+            <a:off x="614364" y="140908"/>
+            <a:ext cx="10515600" cy="799484"/>
+          </a:xfrm>
+          <a:prstGeom prst="rect">
+            <a:avLst/>
+          </a:prstGeom>
+          <a:solidFill>
+            <a:schemeClr val="bg1"/>
+          </a:solidFill>
+        </p:spPr>
+        <p:txBody>
+          <a:bodyPr vert="horz" lIns="91440" tIns="45720" rIns="91440" bIns="45720" rtlCol="0" anchor="b">
+            <a:normAutofit/>
+          </a:bodyPr>
+          <a:lstStyle>
+            <a:lvl1pPr algn="l" defTabSz="914400" rtl="0" eaLnBrk="1" latinLnBrk="0" hangingPunct="1">
+              <a:lnSpc>
+                <a:spcPct val="90000"/>
+              </a:lnSpc>
+              <a:spcBef>
+                <a:spcPct val="0"/>
+              </a:spcBef>
+              <a:buNone/>
+              <a:defRPr sz="3200" b="1" kern="1200">
+                <a:solidFill>
+                  <a:schemeClr val="accent1"/>
+                </a:solidFill>
+                <a:latin typeface="+mj-lt"/>
+                <a:ea typeface="+mj-ea"/>
+                <a:cs typeface="+mj-cs"/>
+              </a:defRPr>
+            </a:lvl1pPr>
+          </a:lstStyle>
+          <a:p>
+            <a:r>
+              <a:rPr lang="en-GB" dirty="0" smtClean="0"/>
+              <a:t>Quorum Network Resources</a:t>
+            </a:r>
+            <a:endParaRPr lang="en-GB" dirty="0"/>
+          </a:p>
+        </p:txBody>
+      </p:sp>
+      <p:pic>
+        <p:nvPicPr>
+          <p:cNvPr id="5" name="Picture 2" descr="http://www.logotypes101.com/logos/659/F7F9770609B3542CB3D6D7F7AC4708CA/RBS_Group.png"/>
+          <p:cNvPicPr>
+            <a:picLocks noChangeAspect="1" noChangeArrowheads="1"/>
+          </p:cNvPicPr>
+          <p:nvPr/>
+        </p:nvPicPr>
+        <p:blipFill>
+          <a:blip r:embed="rId2">
+            <a:extLst>
+              <a:ext uri="{28A0092B-C50C-407E-A947-70E740481C1C}">
+                <a14:useLocalDpi xmlns:a14="http://schemas.microsoft.com/office/drawing/2010/main" val="0"/>
+              </a:ext>
+            </a:extLst>
+          </a:blip>
+          <a:srcRect/>
+          <a:stretch>
+            <a:fillRect/>
+          </a:stretch>
+        </p:blipFill>
+        <p:spPr bwMode="auto">
+          <a:xfrm>
+            <a:off x="460375" y="2325195"/>
+            <a:ext cx="1872343" cy="1872343"/>
+          </a:xfrm>
+          <a:prstGeom prst="rect">
+            <a:avLst/>
+          </a:prstGeom>
+          <a:noFill/>
+          <a:extLst>
+            <a:ext uri="{909E8E84-426E-40DD-AFC4-6F175D3DCCD1}">
+              <a14:hiddenFill xmlns:a14="http://schemas.microsoft.com/office/drawing/2010/main">
+                <a:solidFill>
+                  <a:srgbClr val="FFFFFF"/>
+                </a:solidFill>
+              </a14:hiddenFill>
+            </a:ext>
+          </a:extLst>
+        </p:spPr>
+      </p:pic>
+      <p:pic>
+        <p:nvPicPr>
+          <p:cNvPr id="6" name="Picture 4" descr="File:Lloyds Bank official new logo.png"/>
+          <p:cNvPicPr>
+            <a:picLocks noChangeAspect="1" noChangeArrowheads="1"/>
+          </p:cNvPicPr>
+          <p:nvPr/>
+        </p:nvPicPr>
+        <p:blipFill>
+          <a:blip r:embed="rId3">
+            <a:extLst>
+              <a:ext uri="{28A0092B-C50C-407E-A947-70E740481C1C}">
+                <a14:useLocalDpi xmlns:a14="http://schemas.microsoft.com/office/drawing/2010/main" val="0"/>
+              </a:ext>
+            </a:extLst>
+          </a:blip>
+          <a:srcRect/>
+          <a:stretch>
+            <a:fillRect/>
+          </a:stretch>
+        </p:blipFill>
+        <p:spPr bwMode="auto">
+          <a:xfrm>
+            <a:off x="3086670" y="1998846"/>
+            <a:ext cx="3180139" cy="1719263"/>
+          </a:xfrm>
+          <a:prstGeom prst="rect">
+            <a:avLst/>
+          </a:prstGeom>
+          <a:noFill/>
+          <a:extLst>
+            <a:ext uri="{909E8E84-426E-40DD-AFC4-6F175D3DCCD1}">
+              <a14:hiddenFill xmlns:a14="http://schemas.microsoft.com/office/drawing/2010/main">
+                <a:solidFill>
+                  <a:srgbClr val="FFFFFF"/>
+                </a:solidFill>
+              </a14:hiddenFill>
+            </a:ext>
+          </a:extLst>
+        </p:spPr>
+      </p:pic>
+      <p:pic>
+        <p:nvPicPr>
+          <p:cNvPr id="7" name="Picture 4" descr="https://uk.virginmoney.com/virgin/Images/virgin-money-logo-white_tcm23-26069.jpg"/>
+          <p:cNvPicPr>
+            <a:picLocks noChangeAspect="1" noChangeArrowheads="1"/>
+          </p:cNvPicPr>
+          <p:nvPr/>
+        </p:nvPicPr>
+        <p:blipFill>
+          <a:blip r:embed="rId4" cstate="print">
+            <a:extLst>
+              <a:ext uri="{28A0092B-C50C-407E-A947-70E740481C1C}">
+                <a14:useLocalDpi xmlns:a14="http://schemas.microsoft.com/office/drawing/2010/main" val="0"/>
+              </a:ext>
+            </a:extLst>
+          </a:blip>
+          <a:srcRect/>
+          <a:stretch>
+            <a:fillRect/>
+          </a:stretch>
+        </p:blipFill>
+        <p:spPr bwMode="auto">
+          <a:xfrm>
+            <a:off x="8520305" y="2115602"/>
+            <a:ext cx="2906486" cy="1341136"/>
+          </a:xfrm>
+          <a:prstGeom prst="rect">
+            <a:avLst/>
+          </a:prstGeom>
+          <a:noFill/>
+          <a:extLst>
+            <a:ext uri="{909E8E84-426E-40DD-AFC4-6F175D3DCCD1}">
+              <a14:hiddenFill xmlns:a14="http://schemas.microsoft.com/office/drawing/2010/main">
+                <a:solidFill>
+                  <a:srgbClr val="FFFFFF"/>
+                </a:solidFill>
+              </a14:hiddenFill>
+            </a:ext>
+          </a:extLst>
+        </p:spPr>
+      </p:pic>
+      <p:pic>
+        <p:nvPicPr>
+          <p:cNvPr id="8" name="Picture 6" descr="http://offerclub.co.uk/wp-content/themes/shopperpress/thumbs/tesco-bank.png"/>
+          <p:cNvPicPr>
+            <a:picLocks noChangeAspect="1" noChangeArrowheads="1"/>
+          </p:cNvPicPr>
+          <p:nvPr/>
+        </p:nvPicPr>
+        <p:blipFill>
+          <a:blip r:embed="rId5">
+            <a:extLst>
+              <a:ext uri="{28A0092B-C50C-407E-A947-70E740481C1C}">
+                <a14:useLocalDpi xmlns:a14="http://schemas.microsoft.com/office/drawing/2010/main" val="0"/>
+              </a:ext>
+            </a:extLst>
+          </a:blip>
+          <a:srcRect/>
+          <a:stretch>
+            <a:fillRect/>
+          </a:stretch>
+        </p:blipFill>
+        <p:spPr bwMode="auto">
+          <a:xfrm>
+            <a:off x="9552992" y="3755890"/>
+            <a:ext cx="1576972" cy="1576972"/>
+          </a:xfrm>
+          <a:prstGeom prst="rect">
+            <a:avLst/>
+          </a:prstGeom>
+          <a:noFill/>
+          <a:extLst>
+            <a:ext uri="{909E8E84-426E-40DD-AFC4-6F175D3DCCD1}">
+              <a14:hiddenFill xmlns:a14="http://schemas.microsoft.com/office/drawing/2010/main">
+                <a:solidFill>
+                  <a:srgbClr val="FFFFFF"/>
+                </a:solidFill>
+              </a14:hiddenFill>
+            </a:ext>
+          </a:extLst>
+        </p:spPr>
+      </p:pic>
+      <p:pic>
+        <p:nvPicPr>
+          <p:cNvPr id="9" name="Picture 8" descr="National Australia Bank"/>
+          <p:cNvPicPr>
+            <a:picLocks noChangeAspect="1" noChangeArrowheads="1"/>
+          </p:cNvPicPr>
+          <p:nvPr/>
+        </p:nvPicPr>
+        <p:blipFill>
+          <a:blip r:embed="rId6">
+            <a:extLst>
+              <a:ext uri="{28A0092B-C50C-407E-A947-70E740481C1C}">
+                <a14:useLocalDpi xmlns:a14="http://schemas.microsoft.com/office/drawing/2010/main" val="0"/>
+              </a:ext>
+            </a:extLst>
+          </a:blip>
+          <a:srcRect/>
+          <a:stretch>
+            <a:fillRect/>
+          </a:stretch>
+        </p:blipFill>
+        <p:spPr bwMode="auto">
+          <a:xfrm>
+            <a:off x="8074463" y="4511603"/>
+            <a:ext cx="723900" cy="1057276"/>
+          </a:xfrm>
+          <a:prstGeom prst="rect">
+            <a:avLst/>
+          </a:prstGeom>
+          <a:noFill/>
+          <a:extLst>
+            <a:ext uri="{909E8E84-426E-40DD-AFC4-6F175D3DCCD1}">
+              <a14:hiddenFill xmlns:a14="http://schemas.microsoft.com/office/drawing/2010/main">
+                <a:solidFill>
+                  <a:srgbClr val="FFFFFF"/>
+                </a:solidFill>
+              </a14:hiddenFill>
+            </a:ext>
+          </a:extLst>
+        </p:spPr>
+      </p:pic>
+      <p:pic>
+        <p:nvPicPr>
+          <p:cNvPr id="10" name="Picture 9"/>
+          <p:cNvPicPr>
+            <a:picLocks noChangeAspect="1"/>
+          </p:cNvPicPr>
+          <p:nvPr/>
+        </p:nvPicPr>
+        <p:blipFill>
+          <a:blip r:embed="rId7"/>
+          <a:stretch>
+            <a:fillRect/>
+          </a:stretch>
+        </p:blipFill>
+        <p:spPr>
+          <a:xfrm>
+            <a:off x="5251213" y="4189862"/>
+            <a:ext cx="1952625" cy="1143000"/>
+          </a:xfrm>
+          <a:prstGeom prst="rect">
+            <a:avLst/>
+          </a:prstGeom>
+        </p:spPr>
+      </p:pic>
+      <p:pic>
+        <p:nvPicPr>
+          <p:cNvPr id="11" name="Picture 10"/>
+          <p:cNvPicPr>
+            <a:picLocks noChangeAspect="1"/>
+          </p:cNvPicPr>
+          <p:nvPr/>
+        </p:nvPicPr>
+        <p:blipFill>
+          <a:blip r:embed="rId8"/>
+          <a:stretch>
+            <a:fillRect/>
+          </a:stretch>
+        </p:blipFill>
+        <p:spPr>
+          <a:xfrm>
+            <a:off x="1183417" y="4619919"/>
+            <a:ext cx="3038475" cy="885825"/>
+          </a:xfrm>
+          <a:prstGeom prst="rect">
+            <a:avLst/>
+          </a:prstGeom>
+        </p:spPr>
+      </p:pic>
+      <p:pic>
+        <p:nvPicPr>
+          <p:cNvPr id="12" name="Picture 11"/>
+          <p:cNvPicPr>
+            <a:picLocks noChangeAspect="1"/>
+          </p:cNvPicPr>
+          <p:nvPr/>
+        </p:nvPicPr>
+        <p:blipFill>
+          <a:blip r:embed="rId9"/>
+          <a:stretch>
+            <a:fillRect/>
+          </a:stretch>
+        </p:blipFill>
+        <p:spPr>
+          <a:xfrm>
+            <a:off x="6679044" y="2559932"/>
+            <a:ext cx="1266825" cy="657225"/>
+          </a:xfrm>
+          <a:prstGeom prst="rect">
+            <a:avLst/>
+          </a:prstGeom>
+        </p:spPr>
+      </p:pic>
+      <p:sp>
+        <p:nvSpPr>
+          <p:cNvPr id="13" name="TextBox 12"/>
+          <p:cNvSpPr txBox="1"/>
+          <p:nvPr/>
+        </p:nvSpPr>
+        <p:spPr>
+          <a:xfrm>
+            <a:off x="619770" y="937113"/>
+            <a:ext cx="4226011" cy="369332"/>
+          </a:xfrm>
+          <a:prstGeom prst="rect">
+            <a:avLst/>
+          </a:prstGeom>
+          <a:noFill/>
+        </p:spPr>
+        <p:txBody>
+          <a:bodyPr wrap="square" rtlCol="0">
+            <a:spAutoFit/>
+          </a:bodyPr>
+          <a:lstStyle/>
+          <a:p>
+            <a:r>
+              <a:rPr lang="en-GB" dirty="0" smtClean="0"/>
+              <a:t>The kind of clients we work with:</a:t>
+            </a:r>
+            <a:endParaRPr lang="en-GB" dirty="0"/>
+          </a:p>
+        </p:txBody>
+      </p:sp>
+    </p:spTree>
+    <p:extLst>
+      <p:ext uri="{BB962C8B-B14F-4D97-AF65-F5344CB8AC3E}">
+        <p14:creationId xmlns:p14="http://schemas.microsoft.com/office/powerpoint/2010/main" val="90481481"/>
+      </p:ext>
+    </p:extLst>
+  </p:cSld>
+  <p:clrMapOvr>
+    <a:masterClrMapping/>
+  </p:clrMapOvr>
+  <mc:AlternateContent xmlns:mc="http://schemas.openxmlformats.org/markup-compatibility/2006" xmlns:p14="http://schemas.microsoft.com/office/powerpoint/2010/main">
+    <mc:Choice Requires="p14">
+      <p:transition spd="med" p14:dur="700">
+        <p:fade/>
+      </p:transition>
+    </mc:Choice>
+    <mc:Fallback xmlns="">
+      <p:transition spd="med">
+        <p:fade/>
+      </p:transition>
+    </mc:Fallback>
+  </mc:AlternateContent>
+  <p:timing>
+    <p:tnLst>
+      <p:par>
+        <p:cTn id="1" dur="indefinite" restart="never" nodeType="tmRoot"/>
+      </p:par>
+    </p:tnLst>
+  </p:timing>
+</p:sld>
+</file>
+
+<file path=ppt/slides/slide3.xml><?xml version="1.0" encoding="utf-8"?>
+<p:sld xmlns:a="http://schemas.openxmlformats.org/drawingml/2006/main" xmlns:r="http://schemas.openxmlformats.org/officeDocument/2006/relationships" xmlns:p="http://schemas.openxmlformats.org/presentationml/2006/main">
+  <p:cSld>
+    <p:spTree>
+      <p:nvGrpSpPr>
+        <p:cNvPr id="1" name=""/>
+        <p:cNvGrpSpPr/>
+        <p:nvPr/>
+      </p:nvGrpSpPr>
+      <p:grpSpPr>
+        <a:xfrm>
+          <a:off x="0" y="0"/>
+          <a:ext cx="0" cy="0"/>
+          <a:chOff x="0" y="0"/>
+          <a:chExt cx="0" cy="0"/>
+        </a:xfrm>
+      </p:grpSpPr>
+      <p:sp>
+        <p:nvSpPr>
           <p:cNvPr id="2" name="Title 1"/>
           <p:cNvSpPr>
             <a:spLocks noGrp="1"/>
@@ -15375,7 +16098,12 @@
             <p:ph type="title"/>
           </p:nvPr>
         </p:nvSpPr>
-        <p:spPr/>
+        <p:spPr>
+          <a:xfrm>
+            <a:off x="553994" y="109694"/>
+            <a:ext cx="9601200" cy="608270"/>
+          </a:xfrm>
+        </p:spPr>
         <p:txBody>
           <a:bodyPr/>
           <a:lstStyle/>
@@ -15412,7 +16140,7 @@
         </p:blipFill>
         <p:spPr>
           <a:xfrm rot="5400000">
-            <a:off x="541638" y="2284456"/>
+            <a:off x="-103411" y="1172350"/>
             <a:ext cx="3810000" cy="2857500"/>
           </a:xfrm>
         </p:spPr>
@@ -15439,8 +16167,8 @@
         </p:blipFill>
         <p:spPr>
           <a:xfrm rot="5400000">
-            <a:off x="3713721" y="3138619"/>
-            <a:ext cx="2438397" cy="1828798"/>
+            <a:off x="3010372" y="3967852"/>
+            <a:ext cx="2425715" cy="1819287"/>
           </a:xfrm>
           <a:prstGeom prst="rect">
             <a:avLst/>
@@ -15463,7 +16191,7 @@
         </p:blipFill>
         <p:spPr>
           <a:xfrm>
-            <a:off x="7144662" y="1808206"/>
+            <a:off x="8420809" y="1101092"/>
             <a:ext cx="3249275" cy="2008799"/>
           </a:xfrm>
           <a:prstGeom prst="rect">
@@ -15487,8 +16215,8 @@
         </p:blipFill>
         <p:spPr>
           <a:xfrm>
-            <a:off x="7727816" y="4131241"/>
-            <a:ext cx="3409741" cy="1359311"/>
+            <a:off x="7736054" y="3664638"/>
+            <a:ext cx="4073831" cy="1624054"/>
           </a:xfrm>
           <a:prstGeom prst="rect">
             <a:avLst/>
@@ -15517,8 +16245,68 @@
         </p:blipFill>
         <p:spPr>
           <a:xfrm rot="5400000">
-            <a:off x="6078084" y="4650518"/>
-            <a:ext cx="1418966" cy="1064225"/>
+            <a:off x="5313341" y="4051999"/>
+            <a:ext cx="2043056" cy="1532293"/>
+          </a:xfrm>
+          <a:prstGeom prst="rect">
+            <a:avLst/>
+          </a:prstGeom>
+        </p:spPr>
+      </p:pic>
+      <p:pic>
+        <p:nvPicPr>
+          <p:cNvPr id="3" name="Picture 2"/>
+          <p:cNvPicPr>
+            <a:picLocks noChangeAspect="1"/>
+          </p:cNvPicPr>
+          <p:nvPr/>
+        </p:nvPicPr>
+        <p:blipFill>
+          <a:blip r:embed="rId7" cstate="print">
+            <a:extLst>
+              <a:ext uri="{28A0092B-C50C-407E-A947-70E740481C1C}">
+                <a14:useLocalDpi xmlns:a14="http://schemas.microsoft.com/office/drawing/2010/main" val="0"/>
+              </a:ext>
+            </a:extLst>
+          </a:blip>
+          <a:stretch>
+            <a:fillRect/>
+          </a:stretch>
+        </p:blipFill>
+        <p:spPr>
+          <a:xfrm rot="5400000">
+            <a:off x="5784393" y="1156162"/>
+            <a:ext cx="2531546" cy="1898660"/>
+          </a:xfrm>
+          <a:prstGeom prst="rect">
+            <a:avLst/>
+          </a:prstGeom>
+        </p:spPr>
+      </p:pic>
+      <p:pic>
+        <p:nvPicPr>
+          <p:cNvPr id="9" name="Picture 8"/>
+          <p:cNvPicPr>
+            <a:picLocks noChangeAspect="1"/>
+          </p:cNvPicPr>
+          <p:nvPr/>
+        </p:nvPicPr>
+        <p:blipFill>
+          <a:blip r:embed="rId8" cstate="print">
+            <a:extLst>
+              <a:ext uri="{28A0092B-C50C-407E-A947-70E740481C1C}">
+                <a14:useLocalDpi xmlns:a14="http://schemas.microsoft.com/office/drawing/2010/main" val="0"/>
+              </a:ext>
+            </a:extLst>
+          </a:blip>
+          <a:stretch>
+            <a:fillRect/>
+          </a:stretch>
+        </p:blipFill>
+        <p:spPr>
+          <a:xfrm rot="5400000">
+            <a:off x="2990665" y="1048448"/>
+            <a:ext cx="2818786" cy="2114089"/>
           </a:xfrm>
           <a:prstGeom prst="rect">
             <a:avLst/>
@@ -15547,10 +16335,17 @@
       </p:transition>
     </mc:Fallback>
   </mc:AlternateContent>
+  <p:timing>
+    <p:tnLst>
+      <p:par>
+        <p:cTn id="1" dur="indefinite" restart="never" nodeType="tmRoot"/>
+      </p:par>
+    </p:tnLst>
+  </p:timing>
 </p:sld>
 </file>
 
-<file path=ppt/slides/slide3.xml><?xml version="1.0" encoding="utf-8"?>
+<file path=ppt/slides/slide4.xml><?xml version="1.0" encoding="utf-8"?>
 <p:sld xmlns:a="http://schemas.openxmlformats.org/drawingml/2006/main" xmlns:r="http://schemas.openxmlformats.org/officeDocument/2006/relationships" xmlns:p="http://schemas.openxmlformats.org/presentationml/2006/main">
   <p:cSld>
     <p:spTree>
@@ -15696,10 +16491,17 @@
       </p:transition>
     </mc:Fallback>
   </mc:AlternateContent>
+  <p:timing>
+    <p:tnLst>
+      <p:par>
+        <p:cTn id="1" dur="indefinite" restart="never" nodeType="tmRoot"/>
+      </p:par>
+    </p:tnLst>
+  </p:timing>
 </p:sld>
 </file>
 
-<file path=ppt/slides/slide4.xml><?xml version="1.0" encoding="utf-8"?>
+<file path=ppt/slides/slide5.xml><?xml version="1.0" encoding="utf-8"?>
 <p:sld xmlns:a="http://schemas.openxmlformats.org/drawingml/2006/main" xmlns:r="http://schemas.openxmlformats.org/officeDocument/2006/relationships" xmlns:p="http://schemas.openxmlformats.org/presentationml/2006/main">
   <p:cSld>
     <p:spTree>
@@ -15814,10 +16616,17 @@
       </p:transition>
     </mc:Fallback>
   </mc:AlternateContent>
+  <p:timing>
+    <p:tnLst>
+      <p:par>
+        <p:cTn id="1" dur="indefinite" restart="never" nodeType="tmRoot"/>
+      </p:par>
+    </p:tnLst>
+  </p:timing>
 </p:sld>
 </file>
 
-<file path=ppt/slides/slide5.xml><?xml version="1.0" encoding="utf-8"?>
+<file path=ppt/slides/slide6.xml><?xml version="1.0" encoding="utf-8"?>
 <p:sld xmlns:a="http://schemas.openxmlformats.org/drawingml/2006/main" xmlns:r="http://schemas.openxmlformats.org/officeDocument/2006/relationships" xmlns:p="http://schemas.openxmlformats.org/presentationml/2006/main">
   <p:cSld>
     <p:spTree>
@@ -16019,10 +16828,17 @@
       </p:transition>
     </mc:Fallback>
   </mc:AlternateContent>
+  <p:timing>
+    <p:tnLst>
+      <p:par>
+        <p:cTn id="1" dur="indefinite" restart="never" nodeType="tmRoot"/>
+      </p:par>
+    </p:tnLst>
+  </p:timing>
 </p:sld>
 </file>
 
-<file path=ppt/slides/slide6.xml><?xml version="1.0" encoding="utf-8"?>
+<file path=ppt/slides/slide7.xml><?xml version="1.0" encoding="utf-8"?>
 <p:sld xmlns:a="http://schemas.openxmlformats.org/drawingml/2006/main" xmlns:r="http://schemas.openxmlformats.org/officeDocument/2006/relationships" xmlns:p="http://schemas.openxmlformats.org/presentationml/2006/main">
   <p:cSld>
     <p:spTree>
@@ -16197,10 +17013,90 @@
       </p:transition>
     </mc:Fallback>
   </mc:AlternateContent>
+  <p:timing>
+    <p:tnLst>
+      <p:par>
+        <p:cTn id="1" dur="indefinite" restart="never" nodeType="tmRoot"/>
+      </p:par>
+    </p:tnLst>
+  </p:timing>
 </p:sld>
 </file>
 
-<file path=ppt/slides/slide7.xml><?xml version="1.0" encoding="utf-8"?>
+<file path=ppt/slides/slide8.xml><?xml version="1.0" encoding="utf-8"?>
+<p:sld xmlns:a="http://schemas.openxmlformats.org/drawingml/2006/main" xmlns:r="http://schemas.openxmlformats.org/officeDocument/2006/relationships" xmlns:p="http://schemas.openxmlformats.org/presentationml/2006/main">
+  <p:cSld>
+    <p:spTree>
+      <p:nvGrpSpPr>
+        <p:cNvPr id="1" name=""/>
+        <p:cNvGrpSpPr/>
+        <p:nvPr/>
+      </p:nvGrpSpPr>
+      <p:grpSpPr>
+        <a:xfrm>
+          <a:off x="0" y="0"/>
+          <a:ext cx="0" cy="0"/>
+          <a:chOff x="0" y="0"/>
+          <a:chExt cx="0" cy="0"/>
+        </a:xfrm>
+      </p:grpSpPr>
+      <p:pic>
+        <p:nvPicPr>
+          <p:cNvPr id="2" name="Picture 1"/>
+          <p:cNvPicPr>
+            <a:picLocks noChangeAspect="1"/>
+          </p:cNvPicPr>
+          <p:nvPr/>
+        </p:nvPicPr>
+        <p:blipFill>
+          <a:blip r:embed="rId2"/>
+          <a:stretch>
+            <a:fillRect/>
+          </a:stretch>
+        </p:blipFill>
+        <p:spPr>
+          <a:xfrm>
+            <a:off x="0" y="0"/>
+            <a:ext cx="11574162" cy="6856830"/>
+          </a:xfrm>
+          <a:prstGeom prst="rect">
+            <a:avLst/>
+          </a:prstGeom>
+        </p:spPr>
+      </p:pic>
+    </p:spTree>
+    <p:extLst>
+      <p:ext uri="{BB962C8B-B14F-4D97-AF65-F5344CB8AC3E}">
+        <p14:creationId xmlns:p14="http://schemas.microsoft.com/office/powerpoint/2010/main" val="761845453"/>
+      </p:ext>
+    </p:extLst>
+  </p:cSld>
+  <p:clrMapOvr>
+    <a:masterClrMapping/>
+  </p:clrMapOvr>
+  <mc:AlternateContent xmlns:mc="http://schemas.openxmlformats.org/markup-compatibility/2006" xmlns:p14="http://schemas.microsoft.com/office/powerpoint/2010/main">
+    <mc:Choice Requires="p14">
+      <p:transition spd="med" p14:dur="700">
+        <p:fade/>
+      </p:transition>
+    </mc:Choice>
+    <mc:Fallback xmlns="">
+      <p:transition spd="med">
+        <p:fade/>
+      </p:transition>
+    </mc:Fallback>
+  </mc:AlternateContent>
+  <p:timing>
+    <p:tnLst>
+      <p:par>
+        <p:cTn id="1" dur="indefinite" restart="never" nodeType="tmRoot"/>
+      </p:par>
+    </p:tnLst>
+  </p:timing>
+</p:sld>
+</file>
+
+<file path=ppt/slides/slide9.xml><?xml version="1.0" encoding="utf-8"?>
 <p:sld xmlns:a="http://schemas.openxmlformats.org/drawingml/2006/main" xmlns:r="http://schemas.openxmlformats.org/officeDocument/2006/relationships" xmlns:p="http://schemas.openxmlformats.org/presentationml/2006/main">
   <p:cSld>
     <p:spTree>
@@ -16382,192 +17278,13 @@
       </p:transition>
     </mc:Fallback>
   </mc:AlternateContent>
-</p:sld>
-</file>
-
-<file path=ppt/slides/slide8.xml><?xml version="1.0" encoding="utf-8"?>
-<p:sld xmlns:a="http://schemas.openxmlformats.org/drawingml/2006/main" xmlns:r="http://schemas.openxmlformats.org/officeDocument/2006/relationships" xmlns:p="http://schemas.openxmlformats.org/presentationml/2006/main">
-  <p:cSld>
-    <p:spTree>
-      <p:nvGrpSpPr>
-        <p:cNvPr id="1" name=""/>
-        <p:cNvGrpSpPr/>
-        <p:nvPr/>
-      </p:nvGrpSpPr>
-      <p:grpSpPr>
-        <a:xfrm>
-          <a:off x="0" y="0"/>
-          <a:ext cx="0" cy="0"/>
-          <a:chOff x="0" y="0"/>
-          <a:chExt cx="0" cy="0"/>
-        </a:xfrm>
-      </p:grpSpPr>
-      <p:pic>
-        <p:nvPicPr>
-          <p:cNvPr id="3" name="Picture 2"/>
-          <p:cNvPicPr>
-            <a:picLocks noChangeAspect="1"/>
-          </p:cNvPicPr>
-          <p:nvPr/>
-        </p:nvPicPr>
-        <p:blipFill>
-          <a:blip r:embed="rId2"/>
-          <a:stretch>
-            <a:fillRect/>
-          </a:stretch>
-        </p:blipFill>
-        <p:spPr>
-          <a:xfrm>
-            <a:off x="1834647" y="0"/>
-            <a:ext cx="9239753" cy="6746487"/>
-          </a:xfrm>
-          <a:prstGeom prst="rect">
-            <a:avLst/>
-          </a:prstGeom>
-        </p:spPr>
-      </p:pic>
-    </p:spTree>
-    <p:extLst>
-      <p:ext uri="{BB962C8B-B14F-4D97-AF65-F5344CB8AC3E}">
-        <p14:creationId xmlns:p14="http://schemas.microsoft.com/office/powerpoint/2010/main" val="3100252087"/>
-      </p:ext>
-    </p:extLst>
-  </p:cSld>
-  <p:clrMapOvr>
-    <a:masterClrMapping/>
-  </p:clrMapOvr>
-  <mc:AlternateContent xmlns:mc="http://schemas.openxmlformats.org/markup-compatibility/2006" xmlns:p14="http://schemas.microsoft.com/office/powerpoint/2010/main">
-    <mc:Choice Requires="p14">
-      <p:transition spd="med" p14:dur="700">
-        <p:fade/>
-      </p:transition>
-    </mc:Choice>
-    <mc:Fallback xmlns="">
-      <p:transition spd="med">
-        <p:fade/>
-      </p:transition>
-    </mc:Fallback>
-  </mc:AlternateContent>
-</p:sld>
-</file>
-
-<file path=ppt/slides/slide9.xml><?xml version="1.0" encoding="utf-8"?>
-<p:sld xmlns:a="http://schemas.openxmlformats.org/drawingml/2006/main" xmlns:r="http://schemas.openxmlformats.org/officeDocument/2006/relationships" xmlns:p="http://schemas.openxmlformats.org/presentationml/2006/main">
-  <p:cSld>
-    <p:spTree>
-      <p:nvGrpSpPr>
-        <p:cNvPr id="1" name=""/>
-        <p:cNvGrpSpPr/>
-        <p:nvPr/>
-      </p:nvGrpSpPr>
-      <p:grpSpPr>
-        <a:xfrm>
-          <a:off x="0" y="0"/>
-          <a:ext cx="0" cy="0"/>
-          <a:chOff x="0" y="0"/>
-          <a:chExt cx="0" cy="0"/>
-        </a:xfrm>
-      </p:grpSpPr>
-      <p:sp>
-        <p:nvSpPr>
-          <p:cNvPr id="4" name="Title 3"/>
-          <p:cNvSpPr>
-            <a:spLocks noGrp="1"/>
-          </p:cNvSpPr>
-          <p:nvPr>
-            <p:ph type="title"/>
-          </p:nvPr>
-        </p:nvSpPr>
-        <p:spPr>
-          <a:xfrm>
-            <a:off x="763095" y="255001"/>
-            <a:ext cx="9017000" cy="1142385"/>
-          </a:xfrm>
-        </p:spPr>
-        <p:txBody>
-          <a:bodyPr>
-            <a:normAutofit/>
-          </a:bodyPr>
-          <a:lstStyle/>
-          <a:p>
-            <a:r>
-              <a:rPr lang="en-GB" dirty="0" smtClean="0"/>
-              <a:t>Favour Short local scope variable names</a:t>
-            </a:r>
-            <a:endParaRPr lang="en-GB" dirty="0"/>
-          </a:p>
-        </p:txBody>
-      </p:sp>
-      <p:pic>
-        <p:nvPicPr>
-          <p:cNvPr id="9" name="Picture 8"/>
-          <p:cNvPicPr>
-            <a:picLocks noChangeAspect="1"/>
-          </p:cNvPicPr>
-          <p:nvPr/>
-        </p:nvPicPr>
-        <p:blipFill>
-          <a:blip r:embed="rId2"/>
-          <a:stretch>
-            <a:fillRect/>
-          </a:stretch>
-        </p:blipFill>
-        <p:spPr>
-          <a:xfrm>
-            <a:off x="323604" y="3276546"/>
-            <a:ext cx="10998376" cy="1193853"/>
-          </a:xfrm>
-          <a:prstGeom prst="rect">
-            <a:avLst/>
-          </a:prstGeom>
-        </p:spPr>
-      </p:pic>
-      <p:pic>
-        <p:nvPicPr>
-          <p:cNvPr id="10" name="Picture 9"/>
-          <p:cNvPicPr>
-            <a:picLocks noChangeAspect="1"/>
-          </p:cNvPicPr>
-          <p:nvPr/>
-        </p:nvPicPr>
-        <p:blipFill>
-          <a:blip r:embed="rId3"/>
-          <a:stretch>
-            <a:fillRect/>
-          </a:stretch>
-        </p:blipFill>
-        <p:spPr>
-          <a:xfrm>
-            <a:off x="323604" y="1695321"/>
-            <a:ext cx="11868396" cy="946279"/>
-          </a:xfrm>
-          <a:prstGeom prst="rect">
-            <a:avLst/>
-          </a:prstGeom>
-        </p:spPr>
-      </p:pic>
-    </p:spTree>
-    <p:extLst>
-      <p:ext uri="{BB962C8B-B14F-4D97-AF65-F5344CB8AC3E}">
-        <p14:creationId xmlns:p14="http://schemas.microsoft.com/office/powerpoint/2010/main" val="3429473598"/>
-      </p:ext>
-    </p:extLst>
-  </p:cSld>
-  <p:clrMapOvr>
-    <a:masterClrMapping/>
-  </p:clrMapOvr>
-  <mc:AlternateContent xmlns:mc="http://schemas.openxmlformats.org/markup-compatibility/2006" xmlns:p14="http://schemas.microsoft.com/office/powerpoint/2010/main">
-    <mc:Choice Requires="p14">
-      <p:transition spd="med" p14:dur="700">
-        <p:fade/>
-      </p:transition>
-    </mc:Choice>
-    <mc:Fallback xmlns="">
-      <p:transition spd="med">
-        <p:fade/>
-      </p:transition>
-    </mc:Fallback>
-  </mc:AlternateContent>
+  <p:timing>
+    <p:tnLst>
+      <p:par>
+        <p:cTn id="1" dur="indefinite" restart="never" nodeType="tmRoot"/>
+      </p:par>
+    </p:tnLst>
+  </p:timing>
 </p:sld>
 </file>
 

</xml_diff>

<commit_message>
more work on pres
</commit_message>
<xml_diff>
--- a/Presentation1.pptx
+++ b/Presentation1.pptx
@@ -5,16 +5,16 @@
     <p:sldMasterId id="2147483648" r:id="rId2"/>
   </p:sldMasterIdLst>
   <p:notesMasterIdLst>
-    <p:notesMasterId r:id="rId18"/>
+    <p:notesMasterId r:id="rId23"/>
   </p:notesMasterIdLst>
   <p:handoutMasterIdLst>
-    <p:handoutMasterId r:id="rId19"/>
+    <p:handoutMasterId r:id="rId24"/>
   </p:handoutMasterIdLst>
   <p:sldIdLst>
     <p:sldId id="261" r:id="rId3"/>
-    <p:sldId id="281" r:id="rId4"/>
-    <p:sldId id="271" r:id="rId5"/>
-    <p:sldId id="284" r:id="rId6"/>
+    <p:sldId id="284" r:id="rId4"/>
+    <p:sldId id="281" r:id="rId5"/>
+    <p:sldId id="271" r:id="rId6"/>
     <p:sldId id="272" r:id="rId7"/>
     <p:sldId id="274" r:id="rId8"/>
     <p:sldId id="273" r:id="rId9"/>
@@ -26,6 +26,11 @@
     <p:sldId id="280" r:id="rId15"/>
     <p:sldId id="283" r:id="rId16"/>
     <p:sldId id="278" r:id="rId17"/>
+    <p:sldId id="285" r:id="rId18"/>
+    <p:sldId id="286" r:id="rId19"/>
+    <p:sldId id="289" r:id="rId20"/>
+    <p:sldId id="290" r:id="rId21"/>
+    <p:sldId id="288" r:id="rId22"/>
   </p:sldIdLst>
   <p:sldSz cx="12192000" cy="6858000"/>
   <p:notesSz cx="6858000" cy="9144000"/>
@@ -15173,7 +15178,7 @@
           <a:p>
             <a:r>
               <a:rPr lang="en-GB" dirty="0" smtClean="0"/>
-              <a:t>2.The Simple Stuff</a:t>
+              <a:t>2.Killing Zombies</a:t>
             </a:r>
             <a:endParaRPr lang="en-GB" dirty="0"/>
           </a:p>
@@ -15440,7 +15445,15 @@
           <a:p>
             <a:r>
               <a:rPr lang="en-GB" dirty="0" smtClean="0"/>
-              <a:t>Favour Short local scope variable names</a:t>
+              <a:t>3. Favour </a:t>
+            </a:r>
+            <a:r>
+              <a:rPr lang="en-GB" dirty="0" smtClean="0"/>
+              <a:t>Short local scope </a:t>
+            </a:r>
+            <a:r>
+              <a:rPr lang="en-GB" dirty="0" smtClean="0"/>
+              <a:t>names</a:t>
             </a:r>
             <a:endParaRPr lang="en-GB" dirty="0"/>
           </a:p>
@@ -15566,8 +15579,12 @@
           <a:lstStyle/>
           <a:p>
             <a:r>
+              <a:rPr lang="en-GB" dirty="0"/>
+              <a:t>4</a:t>
+            </a:r>
+            <a:r>
               <a:rPr lang="en-GB" dirty="0" smtClean="0"/>
-              <a:t>Avoid Comments (duck)</a:t>
+              <a:t> Minimise Comments</a:t>
             </a:r>
             <a:endParaRPr lang="en-GB" dirty="0"/>
           </a:p>
@@ -15727,7 +15744,7 @@
         <p:spPr>
           <a:xfrm>
             <a:off x="763095" y="255001"/>
-            <a:ext cx="4850305" cy="1142385"/>
+            <a:ext cx="6819524" cy="1142385"/>
           </a:xfrm>
         </p:spPr>
         <p:txBody>
@@ -15738,22 +15755,50 @@
           <a:p>
             <a:r>
               <a:rPr lang="en-GB" dirty="0" smtClean="0"/>
-              <a:t>Complex Expressions</a:t>
+              <a:t>5. Encapsulate </a:t>
+            </a:r>
+            <a:r>
+              <a:rPr lang="en-GB" dirty="0" smtClean="0"/>
+              <a:t>Complexity</a:t>
             </a:r>
             <a:endParaRPr lang="en-GB" dirty="0"/>
           </a:p>
         </p:txBody>
       </p:sp>
+      <p:pic>
+        <p:nvPicPr>
+          <p:cNvPr id="2" name="Picture 1"/>
+          <p:cNvPicPr>
+            <a:picLocks noChangeAspect="1"/>
+          </p:cNvPicPr>
+          <p:nvPr/>
+        </p:nvPicPr>
+        <p:blipFill>
+          <a:blip r:embed="rId2"/>
+          <a:stretch>
+            <a:fillRect/>
+          </a:stretch>
+        </p:blipFill>
+        <p:spPr>
+          <a:xfrm>
+            <a:off x="463116" y="1578860"/>
+            <a:ext cx="10769175" cy="4166331"/>
+          </a:xfrm>
+          <a:prstGeom prst="rect">
+            <a:avLst/>
+          </a:prstGeom>
+        </p:spPr>
+      </p:pic>
       <p:sp>
         <p:nvSpPr>
-          <p:cNvPr id="5" name="TextBox 4"/>
+          <p:cNvPr id="6" name="TextBox 5"/>
           <p:cNvSpPr txBox="1"/>
           <p:nvPr/>
         </p:nvSpPr>
         <p:spPr>
           <a:xfrm>
-            <a:off x="870187" y="1397386"/>
-            <a:ext cx="6387348" cy="707886"/>
+            <a:off x="8885208" y="5621454"/>
+            <a:ext cx="3094008" cy="246221"/>
           </a:xfrm>
           <a:prstGeom prst="rect">
             <a:avLst/>
@@ -15767,31 +15812,10 @@
           <a:lstStyle/>
           <a:p>
             <a:r>
-              <a:rPr lang="en-GB" sz="2000" dirty="0" smtClean="0"/>
-              <a:t>Try to encapsulate</a:t>
+              <a:rPr lang="en-GB" sz="1000" dirty="0" smtClean="0"/>
+              <a:t>**Inspired by refactoring course on Lynda.com</a:t>
             </a:r>
-          </a:p>
-          <a:p>
-            <a:r>
-              <a:rPr lang="en-GB" sz="2000" dirty="0">
-                <a:hlinkClick r:id="rId2"/>
-              </a:rPr>
-              <a:t>Refactoring Lynda Notes</a:t>
-            </a:r>
-            <a:r>
-              <a:rPr lang="en-GB" sz="2000" dirty="0"/>
-              <a:t>  (</a:t>
-            </a:r>
-            <a:r>
-              <a:rPr lang="en-GB" sz="2000" dirty="0">
-                <a:hlinkClick r:id="rId3"/>
-              </a:rPr>
-              <a:t>Web view</a:t>
-            </a:r>
-            <a:r>
-              <a:rPr lang="en-GB" sz="2000" dirty="0"/>
-              <a:t>)</a:t>
-            </a:r>
+            <a:endParaRPr lang="en-GB" sz="1000" dirty="0" smtClean="0"/>
           </a:p>
         </p:txBody>
       </p:sp>
@@ -15844,6 +15868,60 @@
           <a:chExt cx="0" cy="0"/>
         </a:xfrm>
       </p:grpSpPr>
+      <p:pic>
+        <p:nvPicPr>
+          <p:cNvPr id="2" name="Picture 1"/>
+          <p:cNvPicPr>
+            <a:picLocks noChangeAspect="1"/>
+          </p:cNvPicPr>
+          <p:nvPr/>
+        </p:nvPicPr>
+        <p:blipFill>
+          <a:blip r:embed="rId2"/>
+          <a:stretch>
+            <a:fillRect/>
+          </a:stretch>
+        </p:blipFill>
+        <p:spPr>
+          <a:xfrm>
+            <a:off x="229411" y="479498"/>
+            <a:ext cx="11049452" cy="4256404"/>
+          </a:xfrm>
+          <a:prstGeom prst="rect">
+            <a:avLst/>
+          </a:prstGeom>
+        </p:spPr>
+      </p:pic>
+      <p:sp>
+        <p:nvSpPr>
+          <p:cNvPr id="3" name="TextBox 2"/>
+          <p:cNvSpPr txBox="1"/>
+          <p:nvPr/>
+        </p:nvSpPr>
+        <p:spPr>
+          <a:xfrm>
+            <a:off x="301925" y="5529532"/>
+            <a:ext cx="3129383" cy="400110"/>
+          </a:xfrm>
+          <a:prstGeom prst="rect">
+            <a:avLst/>
+          </a:prstGeom>
+          <a:noFill/>
+        </p:spPr>
+        <p:txBody>
+          <a:bodyPr wrap="none" rtlCol="0">
+            <a:spAutoFit/>
+          </a:bodyPr>
+          <a:lstStyle/>
+          <a:p>
+            <a:r>
+              <a:rPr lang="en-GB" sz="2000" dirty="0" smtClean="0"/>
+              <a:t>Ctrl R M – Extract Method</a:t>
+            </a:r>
+            <a:endParaRPr lang="en-GB" sz="2000" dirty="0"/>
+          </a:p>
+        </p:txBody>
+      </p:sp>
     </p:spTree>
     <p:extLst>
       <p:ext uri="{BB962C8B-B14F-4D97-AF65-F5344CB8AC3E}">
@@ -15876,7 +15954,1079 @@
 </p:sld>
 </file>
 
+<file path=ppt/slides/slide16.xml><?xml version="1.0" encoding="utf-8"?>
+<p:sld xmlns:a="http://schemas.openxmlformats.org/drawingml/2006/main" xmlns:r="http://schemas.openxmlformats.org/officeDocument/2006/relationships" xmlns:p="http://schemas.openxmlformats.org/presentationml/2006/main">
+  <p:cSld>
+    <p:spTree>
+      <p:nvGrpSpPr>
+        <p:cNvPr id="1" name=""/>
+        <p:cNvGrpSpPr/>
+        <p:nvPr/>
+      </p:nvGrpSpPr>
+      <p:grpSpPr>
+        <a:xfrm>
+          <a:off x="0" y="0"/>
+          <a:ext cx="0" cy="0"/>
+          <a:chOff x="0" y="0"/>
+          <a:chExt cx="0" cy="0"/>
+        </a:xfrm>
+      </p:grpSpPr>
+      <p:pic>
+        <p:nvPicPr>
+          <p:cNvPr id="2" name="Picture 1"/>
+          <p:cNvPicPr>
+            <a:picLocks noChangeAspect="1"/>
+          </p:cNvPicPr>
+          <p:nvPr/>
+        </p:nvPicPr>
+        <p:blipFill>
+          <a:blip r:embed="rId2"/>
+          <a:stretch>
+            <a:fillRect/>
+          </a:stretch>
+        </p:blipFill>
+        <p:spPr>
+          <a:xfrm>
+            <a:off x="175409" y="426874"/>
+            <a:ext cx="11492590" cy="5828152"/>
+          </a:xfrm>
+          <a:prstGeom prst="rect">
+            <a:avLst/>
+          </a:prstGeom>
+        </p:spPr>
+      </p:pic>
+    </p:spTree>
+    <p:extLst>
+      <p:ext uri="{BB962C8B-B14F-4D97-AF65-F5344CB8AC3E}">
+        <p14:creationId xmlns:p14="http://schemas.microsoft.com/office/powerpoint/2010/main" val="1034566484"/>
+      </p:ext>
+    </p:extLst>
+  </p:cSld>
+  <p:clrMapOvr>
+    <a:masterClrMapping/>
+  </p:clrMapOvr>
+  <mc:AlternateContent xmlns:mc="http://schemas.openxmlformats.org/markup-compatibility/2006" xmlns:p14="http://schemas.microsoft.com/office/powerpoint/2010/main">
+    <mc:Choice Requires="p14">
+      <p:transition spd="med" p14:dur="700">
+        <p:fade/>
+      </p:transition>
+    </mc:Choice>
+    <mc:Fallback xmlns="">
+      <p:transition spd="med">
+        <p:fade/>
+      </p:transition>
+    </mc:Fallback>
+  </mc:AlternateContent>
+  <p:timing>
+    <p:tnLst>
+      <p:par>
+        <p:cTn id="1" dur="indefinite" restart="never" nodeType="tmRoot"/>
+      </p:par>
+    </p:tnLst>
+  </p:timing>
+</p:sld>
+</file>
+
+<file path=ppt/slides/slide17.xml><?xml version="1.0" encoding="utf-8"?>
+<p:sld xmlns:a="http://schemas.openxmlformats.org/drawingml/2006/main" xmlns:r="http://schemas.openxmlformats.org/officeDocument/2006/relationships" xmlns:p="http://schemas.openxmlformats.org/presentationml/2006/main">
+  <p:cSld>
+    <p:spTree>
+      <p:nvGrpSpPr>
+        <p:cNvPr id="1" name=""/>
+        <p:cNvGrpSpPr/>
+        <p:nvPr/>
+      </p:nvGrpSpPr>
+      <p:grpSpPr>
+        <a:xfrm>
+          <a:off x="0" y="0"/>
+          <a:ext cx="0" cy="0"/>
+          <a:chOff x="0" y="0"/>
+          <a:chExt cx="0" cy="0"/>
+        </a:xfrm>
+      </p:grpSpPr>
+      <p:pic>
+        <p:nvPicPr>
+          <p:cNvPr id="2" name="Picture 1"/>
+          <p:cNvPicPr>
+            <a:picLocks noChangeAspect="1"/>
+          </p:cNvPicPr>
+          <p:nvPr/>
+        </p:nvPicPr>
+        <p:blipFill>
+          <a:blip r:embed="rId2"/>
+          <a:stretch>
+            <a:fillRect/>
+          </a:stretch>
+        </p:blipFill>
+        <p:spPr>
+          <a:xfrm>
+            <a:off x="261638" y="195659"/>
+            <a:ext cx="6044271" cy="3091082"/>
+          </a:xfrm>
+          <a:prstGeom prst="rect">
+            <a:avLst/>
+          </a:prstGeom>
+        </p:spPr>
+      </p:pic>
+      <p:pic>
+        <p:nvPicPr>
+          <p:cNvPr id="3" name="Picture 2"/>
+          <p:cNvPicPr>
+            <a:picLocks noChangeAspect="1"/>
+          </p:cNvPicPr>
+          <p:nvPr/>
+        </p:nvPicPr>
+        <p:blipFill>
+          <a:blip r:embed="rId3"/>
+          <a:stretch>
+            <a:fillRect/>
+          </a:stretch>
+        </p:blipFill>
+        <p:spPr>
+          <a:xfrm>
+            <a:off x="426757" y="3744559"/>
+            <a:ext cx="5358382" cy="2923660"/>
+          </a:xfrm>
+          <a:prstGeom prst="rect">
+            <a:avLst/>
+          </a:prstGeom>
+        </p:spPr>
+      </p:pic>
+    </p:spTree>
+    <p:extLst>
+      <p:ext uri="{BB962C8B-B14F-4D97-AF65-F5344CB8AC3E}">
+        <p14:creationId xmlns:p14="http://schemas.microsoft.com/office/powerpoint/2010/main" val="3975046032"/>
+      </p:ext>
+    </p:extLst>
+  </p:cSld>
+  <p:clrMapOvr>
+    <a:masterClrMapping/>
+  </p:clrMapOvr>
+  <mc:AlternateContent xmlns:mc="http://schemas.openxmlformats.org/markup-compatibility/2006" xmlns:p14="http://schemas.microsoft.com/office/powerpoint/2010/main">
+    <mc:Choice Requires="p14">
+      <p:transition spd="med" p14:dur="700">
+        <p:fade/>
+      </p:transition>
+    </mc:Choice>
+    <mc:Fallback xmlns="">
+      <p:transition spd="med">
+        <p:fade/>
+      </p:transition>
+    </mc:Fallback>
+  </mc:AlternateContent>
+  <p:timing>
+    <p:tnLst>
+      <p:par>
+        <p:cTn id="1" dur="indefinite" restart="never" nodeType="tmRoot">
+          <p:childTnLst>
+            <p:seq concurrent="1" nextAc="seek">
+              <p:cTn id="2" dur="indefinite" nodeType="mainSeq">
+                <p:childTnLst>
+                  <p:par>
+                    <p:cTn id="3" fill="hold">
+                      <p:stCondLst>
+                        <p:cond delay="indefinite"/>
+                      </p:stCondLst>
+                      <p:childTnLst>
+                        <p:par>
+                          <p:cTn id="4" fill="hold">
+                            <p:stCondLst>
+                              <p:cond delay="0"/>
+                            </p:stCondLst>
+                            <p:childTnLst>
+                              <p:par>
+                                <p:cTn id="5" presetID="1" presetClass="entr" presetSubtype="0" fill="hold" nodeType="clickEffect">
+                                  <p:stCondLst>
+                                    <p:cond delay="0"/>
+                                  </p:stCondLst>
+                                  <p:childTnLst>
+                                    <p:set>
+                                      <p:cBhvr>
+                                        <p:cTn id="6" dur="1" fill="hold">
+                                          <p:stCondLst>
+                                            <p:cond delay="0"/>
+                                          </p:stCondLst>
+                                        </p:cTn>
+                                        <p:tgtEl>
+                                          <p:spTgt spid="3"/>
+                                        </p:tgtEl>
+                                        <p:attrNameLst>
+                                          <p:attrName>style.visibility</p:attrName>
+                                        </p:attrNameLst>
+                                      </p:cBhvr>
+                                      <p:to>
+                                        <p:strVal val="visible"/>
+                                      </p:to>
+                                    </p:set>
+                                  </p:childTnLst>
+                                </p:cTn>
+                              </p:par>
+                            </p:childTnLst>
+                          </p:cTn>
+                        </p:par>
+                      </p:childTnLst>
+                    </p:cTn>
+                  </p:par>
+                </p:childTnLst>
+              </p:cTn>
+              <p:prevCondLst>
+                <p:cond evt="onPrev" delay="0">
+                  <p:tgtEl>
+                    <p:sldTgt/>
+                  </p:tgtEl>
+                </p:cond>
+              </p:prevCondLst>
+              <p:nextCondLst>
+                <p:cond evt="onNext" delay="0">
+                  <p:tgtEl>
+                    <p:sldTgt/>
+                  </p:tgtEl>
+                </p:cond>
+              </p:nextCondLst>
+            </p:seq>
+          </p:childTnLst>
+        </p:cTn>
+      </p:par>
+    </p:tnLst>
+  </p:timing>
+</p:sld>
+</file>
+
+<file path=ppt/slides/slide18.xml><?xml version="1.0" encoding="utf-8"?>
+<p:sld xmlns:a="http://schemas.openxmlformats.org/drawingml/2006/main" xmlns:r="http://schemas.openxmlformats.org/officeDocument/2006/relationships" xmlns:p="http://schemas.openxmlformats.org/presentationml/2006/main">
+  <p:cSld>
+    <p:spTree>
+      <p:nvGrpSpPr>
+        <p:cNvPr id="1" name=""/>
+        <p:cNvGrpSpPr/>
+        <p:nvPr/>
+      </p:nvGrpSpPr>
+      <p:grpSpPr>
+        <a:xfrm>
+          <a:off x="0" y="0"/>
+          <a:ext cx="0" cy="0"/>
+          <a:chOff x="0" y="0"/>
+          <a:chExt cx="0" cy="0"/>
+        </a:xfrm>
+      </p:grpSpPr>
+      <p:pic>
+        <p:nvPicPr>
+          <p:cNvPr id="2" name="Picture 1"/>
+          <p:cNvPicPr>
+            <a:picLocks noChangeAspect="1"/>
+          </p:cNvPicPr>
+          <p:nvPr/>
+        </p:nvPicPr>
+        <p:blipFill>
+          <a:blip r:embed="rId2"/>
+          <a:stretch>
+            <a:fillRect/>
+          </a:stretch>
+        </p:blipFill>
+        <p:spPr>
+          <a:xfrm>
+            <a:off x="375057" y="134170"/>
+            <a:ext cx="5542663" cy="3287373"/>
+          </a:xfrm>
+          <a:prstGeom prst="rect">
+            <a:avLst/>
+          </a:prstGeom>
+        </p:spPr>
+      </p:pic>
+      <p:pic>
+        <p:nvPicPr>
+          <p:cNvPr id="3" name="Picture 2"/>
+          <p:cNvPicPr>
+            <a:picLocks noChangeAspect="1"/>
+          </p:cNvPicPr>
+          <p:nvPr/>
+        </p:nvPicPr>
+        <p:blipFill>
+          <a:blip r:embed="rId3"/>
+          <a:stretch>
+            <a:fillRect/>
+          </a:stretch>
+        </p:blipFill>
+        <p:spPr>
+          <a:xfrm>
+            <a:off x="375058" y="5589944"/>
+            <a:ext cx="10295818" cy="999677"/>
+          </a:xfrm>
+          <a:prstGeom prst="rect">
+            <a:avLst/>
+          </a:prstGeom>
+        </p:spPr>
+      </p:pic>
+      <p:pic>
+        <p:nvPicPr>
+          <p:cNvPr id="4" name="Picture 3"/>
+          <p:cNvPicPr>
+            <a:picLocks noChangeAspect="1"/>
+          </p:cNvPicPr>
+          <p:nvPr/>
+        </p:nvPicPr>
+        <p:blipFill>
+          <a:blip r:embed="rId4"/>
+          <a:stretch>
+            <a:fillRect/>
+          </a:stretch>
+        </p:blipFill>
+        <p:spPr>
+          <a:xfrm>
+            <a:off x="375057" y="3590192"/>
+            <a:ext cx="4965395" cy="1922088"/>
+          </a:xfrm>
+          <a:prstGeom prst="rect">
+            <a:avLst/>
+          </a:prstGeom>
+        </p:spPr>
+      </p:pic>
+      <p:pic>
+        <p:nvPicPr>
+          <p:cNvPr id="5" name="Picture 4"/>
+          <p:cNvPicPr>
+            <a:picLocks noChangeAspect="1"/>
+          </p:cNvPicPr>
+          <p:nvPr/>
+        </p:nvPicPr>
+        <p:blipFill>
+          <a:blip r:embed="rId5"/>
+          <a:stretch>
+            <a:fillRect/>
+          </a:stretch>
+        </p:blipFill>
+        <p:spPr>
+          <a:xfrm>
+            <a:off x="6953615" y="134169"/>
+            <a:ext cx="4802420" cy="1539355"/>
+          </a:xfrm>
+          <a:prstGeom prst="rect">
+            <a:avLst/>
+          </a:prstGeom>
+        </p:spPr>
+      </p:pic>
+    </p:spTree>
+    <p:extLst>
+      <p:ext uri="{BB962C8B-B14F-4D97-AF65-F5344CB8AC3E}">
+        <p14:creationId xmlns:p14="http://schemas.microsoft.com/office/powerpoint/2010/main" val="3977094349"/>
+      </p:ext>
+    </p:extLst>
+  </p:cSld>
+  <p:clrMapOvr>
+    <a:masterClrMapping/>
+  </p:clrMapOvr>
+  <mc:AlternateContent xmlns:mc="http://schemas.openxmlformats.org/markup-compatibility/2006" xmlns:p14="http://schemas.microsoft.com/office/powerpoint/2010/main">
+    <mc:Choice Requires="p14">
+      <p:transition spd="med" p14:dur="700">
+        <p:fade/>
+      </p:transition>
+    </mc:Choice>
+    <mc:Fallback xmlns="">
+      <p:transition spd="med">
+        <p:fade/>
+      </p:transition>
+    </mc:Fallback>
+  </mc:AlternateContent>
+  <p:timing>
+    <p:tnLst>
+      <p:par>
+        <p:cTn id="1" dur="indefinite" restart="never" nodeType="tmRoot">
+          <p:childTnLst>
+            <p:seq concurrent="1" nextAc="seek">
+              <p:cTn id="2" dur="indefinite" nodeType="mainSeq">
+                <p:childTnLst>
+                  <p:par>
+                    <p:cTn id="3" fill="hold">
+                      <p:stCondLst>
+                        <p:cond delay="indefinite"/>
+                      </p:stCondLst>
+                      <p:childTnLst>
+                        <p:par>
+                          <p:cTn id="4" fill="hold">
+                            <p:stCondLst>
+                              <p:cond delay="0"/>
+                            </p:stCondLst>
+                            <p:childTnLst>
+                              <p:par>
+                                <p:cTn id="5" presetID="1" presetClass="entr" presetSubtype="0" fill="hold" nodeType="clickEffect">
+                                  <p:stCondLst>
+                                    <p:cond delay="0"/>
+                                  </p:stCondLst>
+                                  <p:childTnLst>
+                                    <p:set>
+                                      <p:cBhvr>
+                                        <p:cTn id="6" dur="1" fill="hold">
+                                          <p:stCondLst>
+                                            <p:cond delay="0"/>
+                                          </p:stCondLst>
+                                        </p:cTn>
+                                        <p:tgtEl>
+                                          <p:spTgt spid="5"/>
+                                        </p:tgtEl>
+                                        <p:attrNameLst>
+                                          <p:attrName>style.visibility</p:attrName>
+                                        </p:attrNameLst>
+                                      </p:cBhvr>
+                                      <p:to>
+                                        <p:strVal val="visible"/>
+                                      </p:to>
+                                    </p:set>
+                                  </p:childTnLst>
+                                </p:cTn>
+                              </p:par>
+                            </p:childTnLst>
+                          </p:cTn>
+                        </p:par>
+                      </p:childTnLst>
+                    </p:cTn>
+                  </p:par>
+                  <p:par>
+                    <p:cTn id="7" fill="hold">
+                      <p:stCondLst>
+                        <p:cond delay="indefinite"/>
+                      </p:stCondLst>
+                      <p:childTnLst>
+                        <p:par>
+                          <p:cTn id="8" fill="hold">
+                            <p:stCondLst>
+                              <p:cond delay="0"/>
+                            </p:stCondLst>
+                            <p:childTnLst>
+                              <p:par>
+                                <p:cTn id="9" presetID="1" presetClass="entr" presetSubtype="0" fill="hold" nodeType="clickEffect">
+                                  <p:stCondLst>
+                                    <p:cond delay="0"/>
+                                  </p:stCondLst>
+                                  <p:childTnLst>
+                                    <p:set>
+                                      <p:cBhvr>
+                                        <p:cTn id="10" dur="1" fill="hold">
+                                          <p:stCondLst>
+                                            <p:cond delay="0"/>
+                                          </p:stCondLst>
+                                        </p:cTn>
+                                        <p:tgtEl>
+                                          <p:spTgt spid="4"/>
+                                        </p:tgtEl>
+                                        <p:attrNameLst>
+                                          <p:attrName>style.visibility</p:attrName>
+                                        </p:attrNameLst>
+                                      </p:cBhvr>
+                                      <p:to>
+                                        <p:strVal val="visible"/>
+                                      </p:to>
+                                    </p:set>
+                                  </p:childTnLst>
+                                </p:cTn>
+                              </p:par>
+                            </p:childTnLst>
+                          </p:cTn>
+                        </p:par>
+                      </p:childTnLst>
+                    </p:cTn>
+                  </p:par>
+                  <p:par>
+                    <p:cTn id="11" fill="hold">
+                      <p:stCondLst>
+                        <p:cond delay="indefinite"/>
+                      </p:stCondLst>
+                      <p:childTnLst>
+                        <p:par>
+                          <p:cTn id="12" fill="hold">
+                            <p:stCondLst>
+                              <p:cond delay="0"/>
+                            </p:stCondLst>
+                            <p:childTnLst>
+                              <p:par>
+                                <p:cTn id="13" presetID="1" presetClass="entr" presetSubtype="0" fill="hold" nodeType="clickEffect">
+                                  <p:stCondLst>
+                                    <p:cond delay="0"/>
+                                  </p:stCondLst>
+                                  <p:childTnLst>
+                                    <p:set>
+                                      <p:cBhvr>
+                                        <p:cTn id="14" dur="1" fill="hold">
+                                          <p:stCondLst>
+                                            <p:cond delay="0"/>
+                                          </p:stCondLst>
+                                        </p:cTn>
+                                        <p:tgtEl>
+                                          <p:spTgt spid="3"/>
+                                        </p:tgtEl>
+                                        <p:attrNameLst>
+                                          <p:attrName>style.visibility</p:attrName>
+                                        </p:attrNameLst>
+                                      </p:cBhvr>
+                                      <p:to>
+                                        <p:strVal val="visible"/>
+                                      </p:to>
+                                    </p:set>
+                                  </p:childTnLst>
+                                </p:cTn>
+                              </p:par>
+                            </p:childTnLst>
+                          </p:cTn>
+                        </p:par>
+                      </p:childTnLst>
+                    </p:cTn>
+                  </p:par>
+                </p:childTnLst>
+              </p:cTn>
+              <p:prevCondLst>
+                <p:cond evt="onPrev" delay="0">
+                  <p:tgtEl>
+                    <p:sldTgt/>
+                  </p:tgtEl>
+                </p:cond>
+              </p:prevCondLst>
+              <p:nextCondLst>
+                <p:cond evt="onNext" delay="0">
+                  <p:tgtEl>
+                    <p:sldTgt/>
+                  </p:tgtEl>
+                </p:cond>
+              </p:nextCondLst>
+            </p:seq>
+          </p:childTnLst>
+        </p:cTn>
+      </p:par>
+    </p:tnLst>
+  </p:timing>
+</p:sld>
+</file>
+
+<file path=ppt/slides/slide19.xml><?xml version="1.0" encoding="utf-8"?>
+<p:sld xmlns:a="http://schemas.openxmlformats.org/drawingml/2006/main" xmlns:r="http://schemas.openxmlformats.org/officeDocument/2006/relationships" xmlns:p="http://schemas.openxmlformats.org/presentationml/2006/main">
+  <p:cSld>
+    <p:spTree>
+      <p:nvGrpSpPr>
+        <p:cNvPr id="1" name=""/>
+        <p:cNvGrpSpPr/>
+        <p:nvPr/>
+      </p:nvGrpSpPr>
+      <p:grpSpPr>
+        <a:xfrm>
+          <a:off x="0" y="0"/>
+          <a:ext cx="0" cy="0"/>
+          <a:chOff x="0" y="0"/>
+          <a:chExt cx="0" cy="0"/>
+        </a:xfrm>
+      </p:grpSpPr>
+      <p:pic>
+        <p:nvPicPr>
+          <p:cNvPr id="2" name="Picture 1"/>
+          <p:cNvPicPr>
+            <a:picLocks noChangeAspect="1"/>
+          </p:cNvPicPr>
+          <p:nvPr/>
+        </p:nvPicPr>
+        <p:blipFill>
+          <a:blip r:embed="rId2"/>
+          <a:stretch>
+            <a:fillRect/>
+          </a:stretch>
+        </p:blipFill>
+        <p:spPr>
+          <a:xfrm>
+            <a:off x="221576" y="155501"/>
+            <a:ext cx="10769175" cy="4166331"/>
+          </a:xfrm>
+          <a:prstGeom prst="rect">
+            <a:avLst/>
+          </a:prstGeom>
+        </p:spPr>
+      </p:pic>
+      <p:pic>
+        <p:nvPicPr>
+          <p:cNvPr id="3" name="Picture 2"/>
+          <p:cNvPicPr>
+            <a:picLocks noChangeAspect="1"/>
+          </p:cNvPicPr>
+          <p:nvPr/>
+        </p:nvPicPr>
+        <p:blipFill>
+          <a:blip r:embed="rId3"/>
+          <a:stretch>
+            <a:fillRect/>
+          </a:stretch>
+        </p:blipFill>
+        <p:spPr>
+          <a:xfrm>
+            <a:off x="221576" y="4444206"/>
+            <a:ext cx="5901360" cy="2284397"/>
+          </a:xfrm>
+          <a:prstGeom prst="rect">
+            <a:avLst/>
+          </a:prstGeom>
+        </p:spPr>
+      </p:pic>
+    </p:spTree>
+    <p:extLst>
+      <p:ext uri="{BB962C8B-B14F-4D97-AF65-F5344CB8AC3E}">
+        <p14:creationId xmlns:p14="http://schemas.microsoft.com/office/powerpoint/2010/main" val="3623693143"/>
+      </p:ext>
+    </p:extLst>
+  </p:cSld>
+  <p:clrMapOvr>
+    <a:masterClrMapping/>
+  </p:clrMapOvr>
+  <mc:AlternateContent xmlns:mc="http://schemas.openxmlformats.org/markup-compatibility/2006" xmlns:p14="http://schemas.microsoft.com/office/powerpoint/2010/main">
+    <mc:Choice Requires="p14">
+      <p:transition spd="med" p14:dur="700">
+        <p:fade/>
+      </p:transition>
+    </mc:Choice>
+    <mc:Fallback xmlns="">
+      <p:transition spd="med">
+        <p:fade/>
+      </p:transition>
+    </mc:Fallback>
+  </mc:AlternateContent>
+  <p:timing>
+    <p:tnLst>
+      <p:par>
+        <p:cTn id="1" dur="indefinite" restart="never" nodeType="tmRoot">
+          <p:childTnLst>
+            <p:seq concurrent="1" nextAc="seek">
+              <p:cTn id="2" dur="indefinite" nodeType="mainSeq">
+                <p:childTnLst>
+                  <p:par>
+                    <p:cTn id="3" fill="hold">
+                      <p:stCondLst>
+                        <p:cond delay="indefinite"/>
+                      </p:stCondLst>
+                      <p:childTnLst>
+                        <p:par>
+                          <p:cTn id="4" fill="hold">
+                            <p:stCondLst>
+                              <p:cond delay="0"/>
+                            </p:stCondLst>
+                            <p:childTnLst>
+                              <p:par>
+                                <p:cTn id="5" presetID="1" presetClass="entr" presetSubtype="0" fill="hold" nodeType="clickEffect">
+                                  <p:stCondLst>
+                                    <p:cond delay="0"/>
+                                  </p:stCondLst>
+                                  <p:childTnLst>
+                                    <p:set>
+                                      <p:cBhvr>
+                                        <p:cTn id="6" dur="1" fill="hold">
+                                          <p:stCondLst>
+                                            <p:cond delay="0"/>
+                                          </p:stCondLst>
+                                        </p:cTn>
+                                        <p:tgtEl>
+                                          <p:spTgt spid="3"/>
+                                        </p:tgtEl>
+                                        <p:attrNameLst>
+                                          <p:attrName>style.visibility</p:attrName>
+                                        </p:attrNameLst>
+                                      </p:cBhvr>
+                                      <p:to>
+                                        <p:strVal val="visible"/>
+                                      </p:to>
+                                    </p:set>
+                                  </p:childTnLst>
+                                </p:cTn>
+                              </p:par>
+                            </p:childTnLst>
+                          </p:cTn>
+                        </p:par>
+                      </p:childTnLst>
+                    </p:cTn>
+                  </p:par>
+                </p:childTnLst>
+              </p:cTn>
+              <p:prevCondLst>
+                <p:cond evt="onPrev" delay="0">
+                  <p:tgtEl>
+                    <p:sldTgt/>
+                  </p:tgtEl>
+                </p:cond>
+              </p:prevCondLst>
+              <p:nextCondLst>
+                <p:cond evt="onNext" delay="0">
+                  <p:tgtEl>
+                    <p:sldTgt/>
+                  </p:tgtEl>
+                </p:cond>
+              </p:nextCondLst>
+            </p:seq>
+          </p:childTnLst>
+        </p:cTn>
+      </p:par>
+    </p:tnLst>
+  </p:timing>
+</p:sld>
+</file>
+
 <file path=ppt/slides/slide2.xml><?xml version="1.0" encoding="utf-8"?>
+<p:sld xmlns:a="http://schemas.openxmlformats.org/drawingml/2006/main" xmlns:r="http://schemas.openxmlformats.org/officeDocument/2006/relationships" xmlns:p="http://schemas.openxmlformats.org/presentationml/2006/main">
+  <p:cSld>
+    <p:spTree>
+      <p:nvGrpSpPr>
+        <p:cNvPr id="1" name=""/>
+        <p:cNvGrpSpPr/>
+        <p:nvPr/>
+      </p:nvGrpSpPr>
+      <p:grpSpPr>
+        <a:xfrm>
+          <a:off x="0" y="0"/>
+          <a:ext cx="0" cy="0"/>
+          <a:chOff x="0" y="0"/>
+          <a:chExt cx="0" cy="0"/>
+        </a:xfrm>
+      </p:grpSpPr>
+      <p:sp>
+        <p:nvSpPr>
+          <p:cNvPr id="2" name="Title 1"/>
+          <p:cNvSpPr>
+            <a:spLocks noGrp="1"/>
+          </p:cNvSpPr>
+          <p:nvPr>
+            <p:ph type="title"/>
+          </p:nvPr>
+        </p:nvSpPr>
+        <p:spPr>
+          <a:xfrm>
+            <a:off x="639793" y="2725946"/>
+            <a:ext cx="3483634" cy="3476446"/>
+          </a:xfrm>
+        </p:spPr>
+        <p:txBody>
+          <a:bodyPr>
+            <a:normAutofit fontScale="90000"/>
+          </a:bodyPr>
+          <a:lstStyle/>
+          <a:p>
+            <a:r>
+              <a:rPr lang="en-GB" sz="4000" dirty="0" smtClean="0"/>
+              <a:t>My practical </a:t>
+            </a:r>
+            <a:br>
+              <a:rPr lang="en-GB" sz="4000" dirty="0" smtClean="0"/>
+            </a:br>
+            <a:r>
+              <a:rPr lang="en-GB" sz="4000" dirty="0" smtClean="0"/>
+              <a:t>guide </a:t>
+            </a:r>
+            <a:r>
+              <a:rPr lang="en-GB" sz="4000" dirty="0" smtClean="0"/>
+              <a:t>(9 months)</a:t>
+            </a:r>
+            <a:r>
+              <a:rPr lang="en-GB" sz="4000" dirty="0" smtClean="0"/>
+              <a:t/>
+            </a:r>
+            <a:br>
+              <a:rPr lang="en-GB" sz="4000" dirty="0" smtClean="0"/>
+            </a:br>
+            <a:r>
+              <a:rPr lang="en-GB" sz="4000" dirty="0" smtClean="0"/>
+              <a:t/>
+            </a:r>
+            <a:br>
+              <a:rPr lang="en-GB" sz="4000" dirty="0" smtClean="0"/>
+            </a:br>
+            <a:r>
+              <a:rPr lang="en-GB" sz="4000" dirty="0" smtClean="0"/>
+              <a:t>http://</a:t>
+            </a:r>
+            <a:br>
+              <a:rPr lang="en-GB" sz="4000" dirty="0" smtClean="0"/>
+            </a:br>
+            <a:r>
+              <a:rPr lang="en-GB" sz="4000" dirty="0" smtClean="0"/>
+              <a:t>refactoring</a:t>
+            </a:r>
+            <a:br>
+              <a:rPr lang="en-GB" sz="4000" dirty="0" smtClean="0"/>
+            </a:br>
+            <a:r>
+              <a:rPr lang="en-GB" sz="4000" dirty="0" smtClean="0"/>
+              <a:t>.azurewebsites.net</a:t>
+            </a:r>
+            <a:br>
+              <a:rPr lang="en-GB" sz="4000" dirty="0" smtClean="0"/>
+            </a:br>
+            <a:r>
+              <a:rPr lang="en-GB" sz="4000" dirty="0"/>
+              <a:t/>
+            </a:r>
+            <a:br>
+              <a:rPr lang="en-GB" sz="4000" dirty="0"/>
+            </a:br>
+            <a:r>
+              <a:rPr lang="en-GB" sz="4000" dirty="0" smtClean="0"/>
+              <a:t>tonight.. The good bits</a:t>
+            </a:r>
+            <a:endParaRPr lang="en-GB" sz="4000" dirty="0"/>
+          </a:p>
+        </p:txBody>
+      </p:sp>
+      <p:pic>
+        <p:nvPicPr>
+          <p:cNvPr id="4" name="Content Placeholder 3"/>
+          <p:cNvPicPr>
+            <a:picLocks noGrp="1" noChangeAspect="1"/>
+          </p:cNvPicPr>
+          <p:nvPr>
+            <p:ph idx="1"/>
+          </p:nvPr>
+        </p:nvPicPr>
+        <p:blipFill>
+          <a:blip r:embed="rId2"/>
+          <a:stretch>
+            <a:fillRect/>
+          </a:stretch>
+        </p:blipFill>
+        <p:spPr>
+          <a:xfrm>
+            <a:off x="5558287" y="0"/>
+            <a:ext cx="6633713" cy="6814558"/>
+          </a:xfrm>
+          <a:prstGeom prst="rect">
+            <a:avLst/>
+          </a:prstGeom>
+        </p:spPr>
+      </p:pic>
+    </p:spTree>
+    <p:extLst>
+      <p:ext uri="{BB962C8B-B14F-4D97-AF65-F5344CB8AC3E}">
+        <p14:creationId xmlns:p14="http://schemas.microsoft.com/office/powerpoint/2010/main" val="3530497725"/>
+      </p:ext>
+    </p:extLst>
+  </p:cSld>
+  <p:clrMapOvr>
+    <a:masterClrMapping/>
+  </p:clrMapOvr>
+  <mc:AlternateContent xmlns:mc="http://schemas.openxmlformats.org/markup-compatibility/2006" xmlns:p14="http://schemas.microsoft.com/office/powerpoint/2010/main">
+    <mc:Choice Requires="p14">
+      <p:transition spd="med" p14:dur="700">
+        <p:fade/>
+      </p:transition>
+    </mc:Choice>
+    <mc:Fallback xmlns="">
+      <p:transition spd="med">
+        <p:fade/>
+      </p:transition>
+    </mc:Fallback>
+  </mc:AlternateContent>
+  <p:timing>
+    <p:tnLst>
+      <p:par>
+        <p:cTn id="1" dur="indefinite" restart="never" nodeType="tmRoot"/>
+      </p:par>
+    </p:tnLst>
+  </p:timing>
+</p:sld>
+</file>
+
+<file path=ppt/slides/slide20.xml><?xml version="1.0" encoding="utf-8"?>
+<p:sld xmlns:a="http://schemas.openxmlformats.org/drawingml/2006/main" xmlns:r="http://schemas.openxmlformats.org/officeDocument/2006/relationships" xmlns:p="http://schemas.openxmlformats.org/presentationml/2006/main">
+  <p:cSld>
+    <p:spTree>
+      <p:nvGrpSpPr>
+        <p:cNvPr id="1" name=""/>
+        <p:cNvGrpSpPr/>
+        <p:nvPr/>
+      </p:nvGrpSpPr>
+      <p:grpSpPr>
+        <a:xfrm>
+          <a:off x="0" y="0"/>
+          <a:ext cx="0" cy="0"/>
+          <a:chOff x="0" y="0"/>
+          <a:chExt cx="0" cy="0"/>
+        </a:xfrm>
+      </p:grpSpPr>
+      <p:sp>
+        <p:nvSpPr>
+          <p:cNvPr id="4" name="Title 3"/>
+          <p:cNvSpPr>
+            <a:spLocks noGrp="1"/>
+          </p:cNvSpPr>
+          <p:nvPr>
+            <p:ph type="title"/>
+          </p:nvPr>
+        </p:nvSpPr>
+        <p:spPr>
+          <a:xfrm>
+            <a:off x="763095" y="255001"/>
+            <a:ext cx="9361566" cy="1142385"/>
+          </a:xfrm>
+        </p:spPr>
+        <p:txBody>
+          <a:bodyPr>
+            <a:normAutofit/>
+          </a:bodyPr>
+          <a:lstStyle/>
+          <a:p>
+            <a:r>
+              <a:rPr lang="en-GB" dirty="0" smtClean="0"/>
+              <a:t>Developer happiness</a:t>
+            </a:r>
+            <a:br>
+              <a:rPr lang="en-GB" dirty="0" smtClean="0"/>
+            </a:br>
+            <a:r>
+              <a:rPr lang="en-GB" dirty="0" smtClean="0"/>
+              <a:t>and testability</a:t>
+            </a:r>
+            <a:endParaRPr lang="en-GB" dirty="0"/>
+          </a:p>
+        </p:txBody>
+      </p:sp>
+      <p:sp>
+        <p:nvSpPr>
+          <p:cNvPr id="8" name="TextBox 7"/>
+          <p:cNvSpPr txBox="1"/>
+          <p:nvPr/>
+        </p:nvSpPr>
+        <p:spPr>
+          <a:xfrm>
+            <a:off x="763095" y="1725282"/>
+            <a:ext cx="4850305" cy="2585323"/>
+          </a:xfrm>
+          <a:prstGeom prst="rect">
+            <a:avLst/>
+          </a:prstGeom>
+          <a:noFill/>
+        </p:spPr>
+        <p:txBody>
+          <a:bodyPr wrap="square" rtlCol="0">
+            <a:spAutoFit/>
+          </a:bodyPr>
+          <a:lstStyle/>
+          <a:p>
+            <a:r>
+              <a:rPr lang="en-GB" dirty="0" smtClean="0"/>
+              <a:t>1.Rename things</a:t>
+            </a:r>
+          </a:p>
+          <a:p>
+            <a:r>
+              <a:rPr lang="en-GB" dirty="0" smtClean="0"/>
+              <a:t>2.Kill zombies (nearly dead) </a:t>
+            </a:r>
+          </a:p>
+          <a:p>
+            <a:r>
+              <a:rPr lang="en-GB" dirty="0" smtClean="0"/>
+              <a:t>3.Favour short local names </a:t>
+            </a:r>
+            <a:r>
+              <a:rPr lang="en-GB" dirty="0" err="1" smtClean="0"/>
+              <a:t>eg</a:t>
+            </a:r>
+            <a:r>
+              <a:rPr lang="en-GB" dirty="0" smtClean="0"/>
+              <a:t> I</a:t>
+            </a:r>
+          </a:p>
+          <a:p>
+            <a:r>
+              <a:rPr lang="en-GB" dirty="0" smtClean="0"/>
+              <a:t>4.Minimise comments</a:t>
+            </a:r>
+          </a:p>
+          <a:p>
+            <a:r>
+              <a:rPr lang="en-GB" dirty="0" smtClean="0"/>
+              <a:t>5.Encapsulate complexity</a:t>
+            </a:r>
+          </a:p>
+          <a:p>
+            <a:endParaRPr lang="en-GB" dirty="0"/>
+          </a:p>
+          <a:p>
+            <a:endParaRPr lang="en-GB" dirty="0" smtClean="0"/>
+          </a:p>
+          <a:p>
+            <a:endParaRPr lang="en-GB" dirty="0"/>
+          </a:p>
+          <a:p>
+            <a:r>
+              <a:rPr lang="en-GB" dirty="0" smtClean="0"/>
+              <a:t>KISS!</a:t>
+            </a:r>
+            <a:endParaRPr lang="en-GB" dirty="0"/>
+          </a:p>
+        </p:txBody>
+      </p:sp>
+      <p:pic>
+        <p:nvPicPr>
+          <p:cNvPr id="9" name="Picture 2" descr="WTFs/m."/>
+          <p:cNvPicPr>
+            <a:picLocks noChangeAspect="1" noChangeArrowheads="1"/>
+          </p:cNvPicPr>
+          <p:nvPr/>
+        </p:nvPicPr>
+        <p:blipFill>
+          <a:blip r:embed="rId2">
+            <a:extLst>
+              <a:ext uri="{28A0092B-C50C-407E-A947-70E740481C1C}">
+                <a14:useLocalDpi xmlns:a14="http://schemas.microsoft.com/office/drawing/2010/main" val="0"/>
+              </a:ext>
+            </a:extLst>
+          </a:blip>
+          <a:srcRect/>
+          <a:stretch>
+            <a:fillRect/>
+          </a:stretch>
+        </p:blipFill>
+        <p:spPr bwMode="auto">
+          <a:xfrm>
+            <a:off x="5744193" y="30371"/>
+            <a:ext cx="6341415" cy="5973614"/>
+          </a:xfrm>
+          <a:prstGeom prst="rect">
+            <a:avLst/>
+          </a:prstGeom>
+          <a:noFill/>
+          <a:extLst>
+            <a:ext uri="{909E8E84-426E-40DD-AFC4-6F175D3DCCD1}">
+              <a14:hiddenFill xmlns:a14="http://schemas.microsoft.com/office/drawing/2010/main">
+                <a:solidFill>
+                  <a:srgbClr val="FFFFFF"/>
+                </a:solidFill>
+              </a14:hiddenFill>
+            </a:ext>
+          </a:extLst>
+        </p:spPr>
+      </p:pic>
+    </p:spTree>
+    <p:extLst>
+      <p:ext uri="{BB962C8B-B14F-4D97-AF65-F5344CB8AC3E}">
+        <p14:creationId xmlns:p14="http://schemas.microsoft.com/office/powerpoint/2010/main" val="3243764467"/>
+      </p:ext>
+    </p:extLst>
+  </p:cSld>
+  <p:clrMapOvr>
+    <a:masterClrMapping/>
+  </p:clrMapOvr>
+  <mc:AlternateContent xmlns:mc="http://schemas.openxmlformats.org/markup-compatibility/2006" xmlns:p14="http://schemas.microsoft.com/office/powerpoint/2010/main">
+    <mc:Choice Requires="p14">
+      <p:transition spd="med" p14:dur="700">
+        <p:fade/>
+      </p:transition>
+    </mc:Choice>
+    <mc:Fallback xmlns="">
+      <p:transition spd="med">
+        <p:fade/>
+      </p:transition>
+    </mc:Fallback>
+  </mc:AlternateContent>
+  <p:timing>
+    <p:tnLst>
+      <p:par>
+        <p:cTn id="1" dur="indefinite" restart="never" nodeType="tmRoot"/>
+      </p:par>
+    </p:tnLst>
+  </p:timing>
+</p:sld>
+</file>
+
+<file path=ppt/slides/slide3.xml><?xml version="1.0" encoding="utf-8"?>
 <p:sld xmlns:a="http://schemas.openxmlformats.org/drawingml/2006/main" xmlns:r="http://schemas.openxmlformats.org/officeDocument/2006/relationships" xmlns:p="http://schemas.openxmlformats.org/presentationml/2006/main">
   <p:cSld>
     <p:spTree>
@@ -16284,7 +17434,7 @@
 </p:sld>
 </file>
 
-<file path=ppt/slides/slide3.xml><?xml version="1.0" encoding="utf-8"?>
+<file path=ppt/slides/slide4.xml><?xml version="1.0" encoding="utf-8"?>
 <p:sld xmlns:a="http://schemas.openxmlformats.org/drawingml/2006/main" xmlns:r="http://schemas.openxmlformats.org/officeDocument/2006/relationships" xmlns:p="http://schemas.openxmlformats.org/presentationml/2006/main">
   <p:cSld>
     <p:spTree>
@@ -16558,118 +17708,6 @@
 </p:sld>
 </file>
 
-<file path=ppt/slides/slide4.xml><?xml version="1.0" encoding="utf-8"?>
-<p:sld xmlns:a="http://schemas.openxmlformats.org/drawingml/2006/main" xmlns:r="http://schemas.openxmlformats.org/officeDocument/2006/relationships" xmlns:p="http://schemas.openxmlformats.org/presentationml/2006/main">
-  <p:cSld>
-    <p:spTree>
-      <p:nvGrpSpPr>
-        <p:cNvPr id="1" name=""/>
-        <p:cNvGrpSpPr/>
-        <p:nvPr/>
-      </p:nvGrpSpPr>
-      <p:grpSpPr>
-        <a:xfrm>
-          <a:off x="0" y="0"/>
-          <a:ext cx="0" cy="0"/>
-          <a:chOff x="0" y="0"/>
-          <a:chExt cx="0" cy="0"/>
-        </a:xfrm>
-      </p:grpSpPr>
-      <p:sp>
-        <p:nvSpPr>
-          <p:cNvPr id="2" name="Title 1"/>
-          <p:cNvSpPr>
-            <a:spLocks noGrp="1"/>
-          </p:cNvSpPr>
-          <p:nvPr>
-            <p:ph type="title"/>
-          </p:nvPr>
-        </p:nvSpPr>
-        <p:spPr>
-          <a:xfrm>
-            <a:off x="346494" y="146648"/>
-            <a:ext cx="3483634" cy="2648310"/>
-          </a:xfrm>
-        </p:spPr>
-        <p:txBody>
-          <a:bodyPr>
-            <a:normAutofit/>
-          </a:bodyPr>
-          <a:lstStyle/>
-          <a:p>
-            <a:r>
-              <a:rPr lang="en-GB" sz="4000" dirty="0" smtClean="0"/>
-              <a:t>My practical </a:t>
-            </a:r>
-            <a:br>
-              <a:rPr lang="en-GB" sz="4000" dirty="0" smtClean="0"/>
-            </a:br>
-            <a:r>
-              <a:rPr lang="en-GB" sz="4000" dirty="0" smtClean="0"/>
-              <a:t>guide </a:t>
-            </a:r>
-            <a:br>
-              <a:rPr lang="en-GB" sz="4000" dirty="0" smtClean="0"/>
-            </a:br>
-            <a:r>
-              <a:rPr lang="en-GB" sz="4000" dirty="0" smtClean="0"/>
-              <a:t>on refactoring</a:t>
-            </a:r>
-            <a:endParaRPr lang="en-GB" sz="4000" dirty="0"/>
-          </a:p>
-        </p:txBody>
-      </p:sp>
-      <p:pic>
-        <p:nvPicPr>
-          <p:cNvPr id="4" name="Content Placeholder 3"/>
-          <p:cNvPicPr>
-            <a:picLocks noGrp="1" noChangeAspect="1"/>
-          </p:cNvPicPr>
-          <p:nvPr>
-            <p:ph idx="1"/>
-          </p:nvPr>
-        </p:nvPicPr>
-        <p:blipFill>
-          <a:blip r:embed="rId2"/>
-          <a:stretch>
-            <a:fillRect/>
-          </a:stretch>
-        </p:blipFill>
-        <p:spPr>
-          <a:xfrm>
-            <a:off x="5558287" y="0"/>
-            <a:ext cx="6633713" cy="6814558"/>
-          </a:xfrm>
-          <a:prstGeom prst="rect">
-            <a:avLst/>
-          </a:prstGeom>
-        </p:spPr>
-      </p:pic>
-    </p:spTree>
-    <p:extLst>
-      <p:ext uri="{BB962C8B-B14F-4D97-AF65-F5344CB8AC3E}">
-        <p14:creationId xmlns:p14="http://schemas.microsoft.com/office/powerpoint/2010/main" val="3530497725"/>
-      </p:ext>
-    </p:extLst>
-  </p:cSld>
-  <p:clrMapOvr>
-    <a:masterClrMapping/>
-  </p:clrMapOvr>
-  <mc:AlternateContent xmlns:mc="http://schemas.openxmlformats.org/markup-compatibility/2006" xmlns:p14="http://schemas.microsoft.com/office/powerpoint/2010/main">
-    <mc:Choice Requires="p14">
-      <p:transition spd="med" p14:dur="700">
-        <p:fade/>
-      </p:transition>
-    </mc:Choice>
-    <mc:Fallback xmlns="">
-      <p:transition spd="med">
-        <p:fade/>
-      </p:transition>
-    </mc:Fallback>
-  </mc:AlternateContent>
-</p:sld>
-</file>
-
 <file path=ppt/slides/slide5.xml><?xml version="1.0" encoding="utf-8"?>
 <p:sld xmlns:a="http://schemas.openxmlformats.org/drawingml/2006/main" xmlns:r="http://schemas.openxmlformats.org/officeDocument/2006/relationships" xmlns:p="http://schemas.openxmlformats.org/presentationml/2006/main">
   <p:cSld>
@@ -16709,7 +17747,11 @@
           <a:p>
             <a:r>
               <a:rPr lang="en-GB" dirty="0" smtClean="0"/>
-              <a:t>1. Naming</a:t>
+              <a:t>1. </a:t>
+            </a:r>
+            <a:r>
+              <a:rPr lang="en-GB" dirty="0" smtClean="0"/>
+              <a:t>Names</a:t>
             </a:r>
             <a:endParaRPr lang="en-GB" dirty="0"/>
           </a:p>
@@ -16728,7 +17770,7 @@
         <p:spPr>
           <a:xfrm>
             <a:off x="1295400" y="1981201"/>
-            <a:ext cx="6223000" cy="3809999"/>
+            <a:ext cx="5346940" cy="3809999"/>
           </a:xfrm>
         </p:spPr>
         <p:txBody>
@@ -16758,7 +17800,11 @@
           <a:p>
             <a:r>
               <a:rPr lang="en-GB" dirty="0" smtClean="0"/>
-              <a:t>Adding meaning to code is what readability is about</a:t>
+              <a:t>Adding meaning to </a:t>
+            </a:r>
+            <a:r>
+              <a:rPr lang="en-GB" dirty="0" smtClean="0"/>
+              <a:t>code</a:t>
             </a:r>
             <a:endParaRPr lang="en-GB" dirty="0"/>
           </a:p>
@@ -16786,8 +17832,8 @@
         </p:blipFill>
         <p:spPr>
           <a:xfrm rot="5400000">
-            <a:off x="7093338" y="824513"/>
-            <a:ext cx="5676216" cy="4257162"/>
+            <a:off x="6162086" y="957549"/>
+            <a:ext cx="6740504" cy="5055378"/>
           </a:xfrm>
           <a:prstGeom prst="rect">
             <a:avLst/>
@@ -16859,8 +17905,8 @@
         </p:blipFill>
         <p:spPr>
           <a:xfrm>
-            <a:off x="648576" y="2117613"/>
-            <a:ext cx="10146452" cy="2081967"/>
+            <a:off x="648575" y="2117613"/>
+            <a:ext cx="11414910" cy="2342244"/>
           </a:xfrm>
           <a:prstGeom prst="rect">
             <a:avLst/>

</xml_diff>